<commit_message>
modifications made to functional reqs & mid-year presentation files
</commit_message>
<xml_diff>
--- a/Mid-year document & presentation/FCI-CU-GP-Midyear-Presentation.pptx
+++ b/Mid-year document & presentation/FCI-CU-GP-Midyear-Presentation.pptx
@@ -4,14 +4,29 @@
   <p:sldMasterIdLst>
     <p:sldMasterId id="2147483648" r:id="rId1"/>
   </p:sldMasterIdLst>
+  <p:notesMasterIdLst>
+    <p:notesMasterId r:id="rId21"/>
+  </p:notesMasterIdLst>
   <p:sldIdLst>
     <p:sldId id="256" r:id="rId2"/>
     <p:sldId id="257" r:id="rId3"/>
-    <p:sldId id="258" r:id="rId4"/>
-    <p:sldId id="259" r:id="rId5"/>
-    <p:sldId id="260" r:id="rId6"/>
-    <p:sldId id="261" r:id="rId7"/>
-    <p:sldId id="262" r:id="rId8"/>
+    <p:sldId id="264" r:id="rId4"/>
+    <p:sldId id="258" r:id="rId5"/>
+    <p:sldId id="263" r:id="rId6"/>
+    <p:sldId id="259" r:id="rId7"/>
+    <p:sldId id="267" r:id="rId8"/>
+    <p:sldId id="272" r:id="rId9"/>
+    <p:sldId id="274" r:id="rId10"/>
+    <p:sldId id="275" r:id="rId11"/>
+    <p:sldId id="273" r:id="rId12"/>
+    <p:sldId id="268" r:id="rId13"/>
+    <p:sldId id="269" r:id="rId14"/>
+    <p:sldId id="270" r:id="rId15"/>
+    <p:sldId id="271" r:id="rId16"/>
+    <p:sldId id="276" r:id="rId17"/>
+    <p:sldId id="260" r:id="rId18"/>
+    <p:sldId id="261" r:id="rId19"/>
+    <p:sldId id="262" r:id="rId20"/>
   </p:sldIdLst>
   <p:sldSz cx="12192000" cy="6858000"/>
   <p:notesSz cx="6858000" cy="9144000"/>
@@ -110,7 +125,649 @@
       </a:defRPr>
     </a:lvl9pPr>
   </p:defaultTextStyle>
+  <p:extLst>
+    <p:ext uri="{EFAFB233-063F-42B5-8137-9DF3F51BA10A}">
+      <p15:sldGuideLst xmlns:p15="http://schemas.microsoft.com/office/powerpoint/2012/main"/>
+    </p:ext>
+  </p:extLst>
 </p:presentation>
+</file>
+
+<file path=ppt/notesMasters/notesMaster1.xml><?xml version="1.0" encoding="utf-8"?>
+<p:notesMaster xmlns:a="http://schemas.openxmlformats.org/drawingml/2006/main" xmlns:r="http://schemas.openxmlformats.org/officeDocument/2006/relationships" xmlns:p="http://schemas.openxmlformats.org/presentationml/2006/main">
+  <p:cSld>
+    <p:bg>
+      <p:bgRef idx="1001">
+        <a:schemeClr val="bg1"/>
+      </p:bgRef>
+    </p:bg>
+    <p:spTree>
+      <p:nvGrpSpPr>
+        <p:cNvPr id="1" name=""/>
+        <p:cNvGrpSpPr/>
+        <p:nvPr/>
+      </p:nvGrpSpPr>
+      <p:grpSpPr>
+        <a:xfrm>
+          <a:off x="0" y="0"/>
+          <a:ext cx="0" cy="0"/>
+          <a:chOff x="0" y="0"/>
+          <a:chExt cx="0" cy="0"/>
+        </a:xfrm>
+      </p:grpSpPr>
+      <p:sp>
+        <p:nvSpPr>
+          <p:cNvPr id="2" name="Header Placeholder 1"/>
+          <p:cNvSpPr>
+            <a:spLocks noGrp="1"/>
+          </p:cNvSpPr>
+          <p:nvPr>
+            <p:ph type="hdr" sz="quarter"/>
+          </p:nvPr>
+        </p:nvSpPr>
+        <p:spPr>
+          <a:xfrm>
+            <a:off x="0" y="0"/>
+            <a:ext cx="2971800" cy="458788"/>
+          </a:xfrm>
+          <a:prstGeom prst="rect">
+            <a:avLst/>
+          </a:prstGeom>
+        </p:spPr>
+        <p:txBody>
+          <a:bodyPr vert="horz" lIns="91440" tIns="45720" rIns="91440" bIns="45720" rtlCol="0"/>
+          <a:lstStyle>
+            <a:lvl1pPr algn="l">
+              <a:defRPr sz="1200"/>
+            </a:lvl1pPr>
+          </a:lstStyle>
+          <a:p>
+            <a:endParaRPr lang="en-US"/>
+          </a:p>
+        </p:txBody>
+      </p:sp>
+      <p:sp>
+        <p:nvSpPr>
+          <p:cNvPr id="3" name="Date Placeholder 2"/>
+          <p:cNvSpPr>
+            <a:spLocks noGrp="1"/>
+          </p:cNvSpPr>
+          <p:nvPr>
+            <p:ph type="dt" idx="1"/>
+          </p:nvPr>
+        </p:nvSpPr>
+        <p:spPr>
+          <a:xfrm>
+            <a:off x="3884613" y="0"/>
+            <a:ext cx="2971800" cy="458788"/>
+          </a:xfrm>
+          <a:prstGeom prst="rect">
+            <a:avLst/>
+          </a:prstGeom>
+        </p:spPr>
+        <p:txBody>
+          <a:bodyPr vert="horz" lIns="91440" tIns="45720" rIns="91440" bIns="45720" rtlCol="0"/>
+          <a:lstStyle>
+            <a:lvl1pPr algn="r">
+              <a:defRPr sz="1200"/>
+            </a:lvl1pPr>
+          </a:lstStyle>
+          <a:p>
+            <a:fld id="{8CDABC68-874F-49E3-B5D2-210DD8387BFF}" type="datetimeFigureOut">
+              <a:rPr lang="en-US" smtClean="0"/>
+              <a:t>2018-02-12</a:t>
+            </a:fld>
+            <a:endParaRPr lang="en-US"/>
+          </a:p>
+        </p:txBody>
+      </p:sp>
+      <p:sp>
+        <p:nvSpPr>
+          <p:cNvPr id="4" name="Slide Image Placeholder 3"/>
+          <p:cNvSpPr>
+            <a:spLocks noGrp="1" noRot="1" noChangeAspect="1"/>
+          </p:cNvSpPr>
+          <p:nvPr>
+            <p:ph type="sldImg" idx="2"/>
+          </p:nvPr>
+        </p:nvSpPr>
+        <p:spPr>
+          <a:xfrm>
+            <a:off x="685800" y="1143000"/>
+            <a:ext cx="5486400" cy="3086100"/>
+          </a:xfrm>
+          <a:prstGeom prst="rect">
+            <a:avLst/>
+          </a:prstGeom>
+          <a:noFill/>
+          <a:ln w="12700">
+            <a:solidFill>
+              <a:prstClr val="black"/>
+            </a:solidFill>
+          </a:ln>
+        </p:spPr>
+        <p:txBody>
+          <a:bodyPr vert="horz" lIns="91440" tIns="45720" rIns="91440" bIns="45720" rtlCol="0" anchor="ctr"/>
+          <a:lstStyle/>
+          <a:p>
+            <a:endParaRPr lang="en-US"/>
+          </a:p>
+        </p:txBody>
+      </p:sp>
+      <p:sp>
+        <p:nvSpPr>
+          <p:cNvPr id="5" name="Notes Placeholder 4"/>
+          <p:cNvSpPr>
+            <a:spLocks noGrp="1"/>
+          </p:cNvSpPr>
+          <p:nvPr>
+            <p:ph type="body" sz="quarter" idx="3"/>
+          </p:nvPr>
+        </p:nvSpPr>
+        <p:spPr>
+          <a:xfrm>
+            <a:off x="685800" y="4400550"/>
+            <a:ext cx="5486400" cy="3600450"/>
+          </a:xfrm>
+          <a:prstGeom prst="rect">
+            <a:avLst/>
+          </a:prstGeom>
+        </p:spPr>
+        <p:txBody>
+          <a:bodyPr vert="horz" lIns="91440" tIns="45720" rIns="91440" bIns="45720" rtlCol="0"/>
+          <a:lstStyle/>
+          <a:p>
+            <a:pPr lvl="0"/>
+            <a:r>
+              <a:rPr lang="en-US"/>
+              <a:t>Edit Master text styles</a:t>
+            </a:r>
+          </a:p>
+          <a:p>
+            <a:pPr lvl="1"/>
+            <a:r>
+              <a:rPr lang="en-US"/>
+              <a:t>Second level</a:t>
+            </a:r>
+          </a:p>
+          <a:p>
+            <a:pPr lvl="2"/>
+            <a:r>
+              <a:rPr lang="en-US"/>
+              <a:t>Third level</a:t>
+            </a:r>
+          </a:p>
+          <a:p>
+            <a:pPr lvl="3"/>
+            <a:r>
+              <a:rPr lang="en-US"/>
+              <a:t>Fourth level</a:t>
+            </a:r>
+          </a:p>
+          <a:p>
+            <a:pPr lvl="4"/>
+            <a:r>
+              <a:rPr lang="en-US"/>
+              <a:t>Fifth level</a:t>
+            </a:r>
+          </a:p>
+        </p:txBody>
+      </p:sp>
+      <p:sp>
+        <p:nvSpPr>
+          <p:cNvPr id="6" name="Footer Placeholder 5"/>
+          <p:cNvSpPr>
+            <a:spLocks noGrp="1"/>
+          </p:cNvSpPr>
+          <p:nvPr>
+            <p:ph type="ftr" sz="quarter" idx="4"/>
+          </p:nvPr>
+        </p:nvSpPr>
+        <p:spPr>
+          <a:xfrm>
+            <a:off x="0" y="8685213"/>
+            <a:ext cx="2971800" cy="458787"/>
+          </a:xfrm>
+          <a:prstGeom prst="rect">
+            <a:avLst/>
+          </a:prstGeom>
+        </p:spPr>
+        <p:txBody>
+          <a:bodyPr vert="horz" lIns="91440" tIns="45720" rIns="91440" bIns="45720" rtlCol="0" anchor="b"/>
+          <a:lstStyle>
+            <a:lvl1pPr algn="l">
+              <a:defRPr sz="1200"/>
+            </a:lvl1pPr>
+          </a:lstStyle>
+          <a:p>
+            <a:endParaRPr lang="en-US"/>
+          </a:p>
+        </p:txBody>
+      </p:sp>
+      <p:sp>
+        <p:nvSpPr>
+          <p:cNvPr id="7" name="Slide Number Placeholder 6"/>
+          <p:cNvSpPr>
+            <a:spLocks noGrp="1"/>
+          </p:cNvSpPr>
+          <p:nvPr>
+            <p:ph type="sldNum" sz="quarter" idx="5"/>
+          </p:nvPr>
+        </p:nvSpPr>
+        <p:spPr>
+          <a:xfrm>
+            <a:off x="3884613" y="8685213"/>
+            <a:ext cx="2971800" cy="458787"/>
+          </a:xfrm>
+          <a:prstGeom prst="rect">
+            <a:avLst/>
+          </a:prstGeom>
+        </p:spPr>
+        <p:txBody>
+          <a:bodyPr vert="horz" lIns="91440" tIns="45720" rIns="91440" bIns="45720" rtlCol="0" anchor="b"/>
+          <a:lstStyle>
+            <a:lvl1pPr algn="r">
+              <a:defRPr sz="1200"/>
+            </a:lvl1pPr>
+          </a:lstStyle>
+          <a:p>
+            <a:fld id="{0FB4A6A8-3C43-42F1-97AC-324A60F76658}" type="slidenum">
+              <a:rPr lang="en-US" smtClean="0"/>
+              <a:t>‹#›</a:t>
+            </a:fld>
+            <a:endParaRPr lang="en-US"/>
+          </a:p>
+        </p:txBody>
+      </p:sp>
+    </p:spTree>
+    <p:extLst>
+      <p:ext uri="{BB962C8B-B14F-4D97-AF65-F5344CB8AC3E}">
+        <p14:creationId xmlns:p14="http://schemas.microsoft.com/office/powerpoint/2010/main" val="2827420459"/>
+      </p:ext>
+    </p:extLst>
+  </p:cSld>
+  <p:clrMap bg1="lt1" tx1="dk1" bg2="lt2" tx2="dk2" accent1="accent1" accent2="accent2" accent3="accent3" accent4="accent4" accent5="accent5" accent6="accent6" hlink="hlink" folHlink="folHlink"/>
+  <p:notesStyle>
+    <a:lvl1pPr marL="0" algn="l" defTabSz="914400" rtl="0" eaLnBrk="1" latinLnBrk="0" hangingPunct="1">
+      <a:defRPr sz="1200" kern="1200">
+        <a:solidFill>
+          <a:schemeClr val="tx1"/>
+        </a:solidFill>
+        <a:latin typeface="+mn-lt"/>
+        <a:ea typeface="+mn-ea"/>
+        <a:cs typeface="+mn-cs"/>
+      </a:defRPr>
+    </a:lvl1pPr>
+    <a:lvl2pPr marL="457200" algn="l" defTabSz="914400" rtl="0" eaLnBrk="1" latinLnBrk="0" hangingPunct="1">
+      <a:defRPr sz="1200" kern="1200">
+        <a:solidFill>
+          <a:schemeClr val="tx1"/>
+        </a:solidFill>
+        <a:latin typeface="+mn-lt"/>
+        <a:ea typeface="+mn-ea"/>
+        <a:cs typeface="+mn-cs"/>
+      </a:defRPr>
+    </a:lvl2pPr>
+    <a:lvl3pPr marL="914400" algn="l" defTabSz="914400" rtl="0" eaLnBrk="1" latinLnBrk="0" hangingPunct="1">
+      <a:defRPr sz="1200" kern="1200">
+        <a:solidFill>
+          <a:schemeClr val="tx1"/>
+        </a:solidFill>
+        <a:latin typeface="+mn-lt"/>
+        <a:ea typeface="+mn-ea"/>
+        <a:cs typeface="+mn-cs"/>
+      </a:defRPr>
+    </a:lvl3pPr>
+    <a:lvl4pPr marL="1371600" algn="l" defTabSz="914400" rtl="0" eaLnBrk="1" latinLnBrk="0" hangingPunct="1">
+      <a:defRPr sz="1200" kern="1200">
+        <a:solidFill>
+          <a:schemeClr val="tx1"/>
+        </a:solidFill>
+        <a:latin typeface="+mn-lt"/>
+        <a:ea typeface="+mn-ea"/>
+        <a:cs typeface="+mn-cs"/>
+      </a:defRPr>
+    </a:lvl4pPr>
+    <a:lvl5pPr marL="1828800" algn="l" defTabSz="914400" rtl="0" eaLnBrk="1" latinLnBrk="0" hangingPunct="1">
+      <a:defRPr sz="1200" kern="1200">
+        <a:solidFill>
+          <a:schemeClr val="tx1"/>
+        </a:solidFill>
+        <a:latin typeface="+mn-lt"/>
+        <a:ea typeface="+mn-ea"/>
+        <a:cs typeface="+mn-cs"/>
+      </a:defRPr>
+    </a:lvl5pPr>
+    <a:lvl6pPr marL="2286000" algn="l" defTabSz="914400" rtl="0" eaLnBrk="1" latinLnBrk="0" hangingPunct="1">
+      <a:defRPr sz="1200" kern="1200">
+        <a:solidFill>
+          <a:schemeClr val="tx1"/>
+        </a:solidFill>
+        <a:latin typeface="+mn-lt"/>
+        <a:ea typeface="+mn-ea"/>
+        <a:cs typeface="+mn-cs"/>
+      </a:defRPr>
+    </a:lvl6pPr>
+    <a:lvl7pPr marL="2743200" algn="l" defTabSz="914400" rtl="0" eaLnBrk="1" latinLnBrk="0" hangingPunct="1">
+      <a:defRPr sz="1200" kern="1200">
+        <a:solidFill>
+          <a:schemeClr val="tx1"/>
+        </a:solidFill>
+        <a:latin typeface="+mn-lt"/>
+        <a:ea typeface="+mn-ea"/>
+        <a:cs typeface="+mn-cs"/>
+      </a:defRPr>
+    </a:lvl7pPr>
+    <a:lvl8pPr marL="3200400" algn="l" defTabSz="914400" rtl="0" eaLnBrk="1" latinLnBrk="0" hangingPunct="1">
+      <a:defRPr sz="1200" kern="1200">
+        <a:solidFill>
+          <a:schemeClr val="tx1"/>
+        </a:solidFill>
+        <a:latin typeface="+mn-lt"/>
+        <a:ea typeface="+mn-ea"/>
+        <a:cs typeface="+mn-cs"/>
+      </a:defRPr>
+    </a:lvl8pPr>
+    <a:lvl9pPr marL="3657600" algn="l" defTabSz="914400" rtl="0" eaLnBrk="1" latinLnBrk="0" hangingPunct="1">
+      <a:defRPr sz="1200" kern="1200">
+        <a:solidFill>
+          <a:schemeClr val="tx1"/>
+        </a:solidFill>
+        <a:latin typeface="+mn-lt"/>
+        <a:ea typeface="+mn-ea"/>
+        <a:cs typeface="+mn-cs"/>
+      </a:defRPr>
+    </a:lvl9pPr>
+  </p:notesStyle>
+</p:notesMaster>
+</file>
+
+<file path=ppt/notesSlides/notesSlide1.xml><?xml version="1.0" encoding="utf-8"?>
+<p:notes xmlns:a="http://schemas.openxmlformats.org/drawingml/2006/main" xmlns:r="http://schemas.openxmlformats.org/officeDocument/2006/relationships" xmlns:p="http://schemas.openxmlformats.org/presentationml/2006/main">
+  <p:cSld>
+    <p:spTree>
+      <p:nvGrpSpPr>
+        <p:cNvPr id="1" name=""/>
+        <p:cNvGrpSpPr/>
+        <p:nvPr/>
+      </p:nvGrpSpPr>
+      <p:grpSpPr>
+        <a:xfrm>
+          <a:off x="0" y="0"/>
+          <a:ext cx="0" cy="0"/>
+          <a:chOff x="0" y="0"/>
+          <a:chExt cx="0" cy="0"/>
+        </a:xfrm>
+      </p:grpSpPr>
+      <p:sp>
+        <p:nvSpPr>
+          <p:cNvPr id="2" name="Slide Image Placeholder 1"/>
+          <p:cNvSpPr>
+            <a:spLocks noGrp="1" noRot="1" noChangeAspect="1"/>
+          </p:cNvSpPr>
+          <p:nvPr>
+            <p:ph type="sldImg"/>
+          </p:nvPr>
+        </p:nvSpPr>
+        <p:spPr/>
+      </p:sp>
+      <p:sp>
+        <p:nvSpPr>
+          <p:cNvPr id="3" name="Notes Placeholder 2"/>
+          <p:cNvSpPr>
+            <a:spLocks noGrp="1"/>
+          </p:cNvSpPr>
+          <p:nvPr>
+            <p:ph type="body" idx="1"/>
+          </p:nvPr>
+        </p:nvSpPr>
+        <p:spPr/>
+        <p:txBody>
+          <a:bodyPr/>
+          <a:lstStyle/>
+          <a:p>
+            <a:r>
+              <a:rPr lang="en-US" dirty="0"/>
+              <a:t>Dispersed: </a:t>
+            </a:r>
+            <a:r>
+              <a:rPr lang="ar-EG" dirty="0"/>
+              <a:t>مشتت</a:t>
+            </a:r>
+            <a:endParaRPr lang="en-US" dirty="0"/>
+          </a:p>
+        </p:txBody>
+      </p:sp>
+      <p:sp>
+        <p:nvSpPr>
+          <p:cNvPr id="4" name="Slide Number Placeholder 3"/>
+          <p:cNvSpPr>
+            <a:spLocks noGrp="1"/>
+          </p:cNvSpPr>
+          <p:nvPr>
+            <p:ph type="sldNum" sz="quarter" idx="10"/>
+          </p:nvPr>
+        </p:nvSpPr>
+        <p:spPr/>
+        <p:txBody>
+          <a:bodyPr/>
+          <a:lstStyle/>
+          <a:p>
+            <a:fld id="{0FB4A6A8-3C43-42F1-97AC-324A60F76658}" type="slidenum">
+              <a:rPr lang="en-US" smtClean="0"/>
+              <a:t>4</a:t>
+            </a:fld>
+            <a:endParaRPr lang="en-US"/>
+          </a:p>
+        </p:txBody>
+      </p:sp>
+    </p:spTree>
+    <p:extLst>
+      <p:ext uri="{BB962C8B-B14F-4D97-AF65-F5344CB8AC3E}">
+        <p14:creationId xmlns:p14="http://schemas.microsoft.com/office/powerpoint/2010/main" val="1137325917"/>
+      </p:ext>
+    </p:extLst>
+  </p:cSld>
+  <p:clrMapOvr>
+    <a:masterClrMapping/>
+  </p:clrMapOvr>
+</p:notes>
+</file>
+
+<file path=ppt/notesSlides/notesSlide2.xml><?xml version="1.0" encoding="utf-8"?>
+<p:notes xmlns:a="http://schemas.openxmlformats.org/drawingml/2006/main" xmlns:r="http://schemas.openxmlformats.org/officeDocument/2006/relationships" xmlns:p="http://schemas.openxmlformats.org/presentationml/2006/main">
+  <p:cSld>
+    <p:spTree>
+      <p:nvGrpSpPr>
+        <p:cNvPr id="1" name=""/>
+        <p:cNvGrpSpPr/>
+        <p:nvPr/>
+      </p:nvGrpSpPr>
+      <p:grpSpPr>
+        <a:xfrm>
+          <a:off x="0" y="0"/>
+          <a:ext cx="0" cy="0"/>
+          <a:chOff x="0" y="0"/>
+          <a:chExt cx="0" cy="0"/>
+        </a:xfrm>
+      </p:grpSpPr>
+      <p:sp>
+        <p:nvSpPr>
+          <p:cNvPr id="2" name="Slide Image Placeholder 1"/>
+          <p:cNvSpPr>
+            <a:spLocks noGrp="1" noRot="1" noChangeAspect="1"/>
+          </p:cNvSpPr>
+          <p:nvPr>
+            <p:ph type="sldImg"/>
+          </p:nvPr>
+        </p:nvSpPr>
+        <p:spPr/>
+      </p:sp>
+      <p:sp>
+        <p:nvSpPr>
+          <p:cNvPr id="3" name="Notes Placeholder 2"/>
+          <p:cNvSpPr>
+            <a:spLocks noGrp="1"/>
+          </p:cNvSpPr>
+          <p:nvPr>
+            <p:ph type="body" idx="1"/>
+          </p:nvPr>
+        </p:nvSpPr>
+        <p:spPr/>
+        <p:txBody>
+          <a:bodyPr/>
+          <a:lstStyle/>
+          <a:p>
+            <a:r>
+              <a:rPr lang="en-US" sz="1200" b="0" i="0" kern="1200" dirty="0">
+                <a:solidFill>
+                  <a:schemeClr val="tx1"/>
+                </a:solidFill>
+                <a:effectLst/>
+                <a:latin typeface="+mn-lt"/>
+                <a:ea typeface="+mn-ea"/>
+                <a:cs typeface="+mn-cs"/>
+              </a:rPr>
+              <a:t>A service is a discrete unit of functionality that can be accessed remotely and acted upon and updated independently, such as retrieving a credit card statement online.</a:t>
+            </a:r>
+            <a:endParaRPr lang="en-US" dirty="0"/>
+          </a:p>
+        </p:txBody>
+      </p:sp>
+      <p:sp>
+        <p:nvSpPr>
+          <p:cNvPr id="4" name="Slide Number Placeholder 3"/>
+          <p:cNvSpPr>
+            <a:spLocks noGrp="1"/>
+          </p:cNvSpPr>
+          <p:nvPr>
+            <p:ph type="sldNum" sz="quarter" idx="10"/>
+          </p:nvPr>
+        </p:nvSpPr>
+        <p:spPr/>
+        <p:txBody>
+          <a:bodyPr/>
+          <a:lstStyle/>
+          <a:p>
+            <a:fld id="{0FB4A6A8-3C43-42F1-97AC-324A60F76658}" type="slidenum">
+              <a:rPr lang="en-US" smtClean="0"/>
+              <a:t>6</a:t>
+            </a:fld>
+            <a:endParaRPr lang="en-US"/>
+          </a:p>
+        </p:txBody>
+      </p:sp>
+    </p:spTree>
+    <p:extLst>
+      <p:ext uri="{BB962C8B-B14F-4D97-AF65-F5344CB8AC3E}">
+        <p14:creationId xmlns:p14="http://schemas.microsoft.com/office/powerpoint/2010/main" val="3261281826"/>
+      </p:ext>
+    </p:extLst>
+  </p:cSld>
+  <p:clrMapOvr>
+    <a:masterClrMapping/>
+  </p:clrMapOvr>
+</p:notes>
+</file>
+
+<file path=ppt/notesSlides/notesSlide3.xml><?xml version="1.0" encoding="utf-8"?>
+<p:notes xmlns:a="http://schemas.openxmlformats.org/drawingml/2006/main" xmlns:r="http://schemas.openxmlformats.org/officeDocument/2006/relationships" xmlns:p="http://schemas.openxmlformats.org/presentationml/2006/main">
+  <p:cSld>
+    <p:spTree>
+      <p:nvGrpSpPr>
+        <p:cNvPr id="1" name=""/>
+        <p:cNvGrpSpPr/>
+        <p:nvPr/>
+      </p:nvGrpSpPr>
+      <p:grpSpPr>
+        <a:xfrm>
+          <a:off x="0" y="0"/>
+          <a:ext cx="0" cy="0"/>
+          <a:chOff x="0" y="0"/>
+          <a:chExt cx="0" cy="0"/>
+        </a:xfrm>
+      </p:grpSpPr>
+      <p:sp>
+        <p:nvSpPr>
+          <p:cNvPr id="2" name="Slide Image Placeholder 1"/>
+          <p:cNvSpPr>
+            <a:spLocks noGrp="1" noRot="1" noChangeAspect="1"/>
+          </p:cNvSpPr>
+          <p:nvPr>
+            <p:ph type="sldImg"/>
+          </p:nvPr>
+        </p:nvSpPr>
+        <p:spPr/>
+      </p:sp>
+      <p:sp>
+        <p:nvSpPr>
+          <p:cNvPr id="3" name="Notes Placeholder 2"/>
+          <p:cNvSpPr>
+            <a:spLocks noGrp="1"/>
+          </p:cNvSpPr>
+          <p:nvPr>
+            <p:ph type="body" idx="1"/>
+          </p:nvPr>
+        </p:nvSpPr>
+        <p:spPr/>
+        <p:txBody>
+          <a:bodyPr/>
+          <a:lstStyle/>
+          <a:p>
+            <a:r>
+              <a:rPr lang="en-US" dirty="0"/>
+              <a:t>Stakeholder: </a:t>
+            </a:r>
+            <a:r>
+              <a:rPr lang="en-US" sz="1200" b="0" i="0" kern="1200" dirty="0">
+                <a:solidFill>
+                  <a:schemeClr val="tx1"/>
+                </a:solidFill>
+                <a:effectLst/>
+                <a:latin typeface="+mn-lt"/>
+                <a:ea typeface="+mn-ea"/>
+                <a:cs typeface="+mn-cs"/>
+              </a:rPr>
+              <a:t>a person with an interest or concern in something, especially a business.</a:t>
+            </a:r>
+            <a:endParaRPr lang="en-US" dirty="0"/>
+          </a:p>
+        </p:txBody>
+      </p:sp>
+      <p:sp>
+        <p:nvSpPr>
+          <p:cNvPr id="4" name="Slide Number Placeholder 3"/>
+          <p:cNvSpPr>
+            <a:spLocks noGrp="1"/>
+          </p:cNvSpPr>
+          <p:nvPr>
+            <p:ph type="sldNum" sz="quarter" idx="10"/>
+          </p:nvPr>
+        </p:nvSpPr>
+        <p:spPr/>
+        <p:txBody>
+          <a:bodyPr/>
+          <a:lstStyle/>
+          <a:p>
+            <a:fld id="{0FB4A6A8-3C43-42F1-97AC-324A60F76658}" type="slidenum">
+              <a:rPr lang="en-US" smtClean="0"/>
+              <a:t>7</a:t>
+            </a:fld>
+            <a:endParaRPr lang="en-US"/>
+          </a:p>
+        </p:txBody>
+      </p:sp>
+    </p:spTree>
+    <p:extLst>
+      <p:ext uri="{BB962C8B-B14F-4D97-AF65-F5344CB8AC3E}">
+        <p14:creationId xmlns:p14="http://schemas.microsoft.com/office/powerpoint/2010/main" val="3005104816"/>
+      </p:ext>
+    </p:extLst>
+  </p:cSld>
+  <p:clrMapOvr>
+    <a:masterClrMapping/>
+  </p:clrMapOvr>
+</p:notes>
 </file>
 
 <file path=ppt/slideLayouts/slideLayout1.xml><?xml version="1.0" encoding="utf-8"?>
@@ -260,7 +917,7 @@
           <a:p>
             <a:fld id="{F03E57DB-E231-45C1-80AB-E8EAD4D6FBB2}" type="datetimeFigureOut">
               <a:rPr lang="en-US" smtClean="0"/>
-              <a:t>2018-02-09</a:t>
+              <a:t>2018-02-12</a:t>
             </a:fld>
             <a:endParaRPr lang="en-US"/>
           </a:p>
@@ -458,7 +1115,7 @@
           <a:p>
             <a:fld id="{F03E57DB-E231-45C1-80AB-E8EAD4D6FBB2}" type="datetimeFigureOut">
               <a:rPr lang="en-US" smtClean="0"/>
-              <a:t>2018-02-09</a:t>
+              <a:t>2018-02-12</a:t>
             </a:fld>
             <a:endParaRPr lang="en-US"/>
           </a:p>
@@ -666,7 +1323,7 @@
           <a:p>
             <a:fld id="{F03E57DB-E231-45C1-80AB-E8EAD4D6FBB2}" type="datetimeFigureOut">
               <a:rPr lang="en-US" smtClean="0"/>
-              <a:t>2018-02-09</a:t>
+              <a:t>2018-02-12</a:t>
             </a:fld>
             <a:endParaRPr lang="en-US"/>
           </a:p>
@@ -864,7 +1521,7 @@
           <a:p>
             <a:fld id="{F03E57DB-E231-45C1-80AB-E8EAD4D6FBB2}" type="datetimeFigureOut">
               <a:rPr lang="en-US" smtClean="0"/>
-              <a:t>2018-02-09</a:t>
+              <a:t>2018-02-12</a:t>
             </a:fld>
             <a:endParaRPr lang="en-US"/>
           </a:p>
@@ -1139,7 +1796,7 @@
           <a:p>
             <a:fld id="{F03E57DB-E231-45C1-80AB-E8EAD4D6FBB2}" type="datetimeFigureOut">
               <a:rPr lang="en-US" smtClean="0"/>
-              <a:t>2018-02-09</a:t>
+              <a:t>2018-02-12</a:t>
             </a:fld>
             <a:endParaRPr lang="en-US"/>
           </a:p>
@@ -1404,7 +2061,7 @@
           <a:p>
             <a:fld id="{F03E57DB-E231-45C1-80AB-E8EAD4D6FBB2}" type="datetimeFigureOut">
               <a:rPr lang="en-US" smtClean="0"/>
-              <a:t>2018-02-09</a:t>
+              <a:t>2018-02-12</a:t>
             </a:fld>
             <a:endParaRPr lang="en-US"/>
           </a:p>
@@ -1816,7 +2473,7 @@
           <a:p>
             <a:fld id="{F03E57DB-E231-45C1-80AB-E8EAD4D6FBB2}" type="datetimeFigureOut">
               <a:rPr lang="en-US" smtClean="0"/>
-              <a:t>2018-02-09</a:t>
+              <a:t>2018-02-12</a:t>
             </a:fld>
             <a:endParaRPr lang="en-US"/>
           </a:p>
@@ -1957,7 +2614,7 @@
           <a:p>
             <a:fld id="{F03E57DB-E231-45C1-80AB-E8EAD4D6FBB2}" type="datetimeFigureOut">
               <a:rPr lang="en-US" smtClean="0"/>
-              <a:t>2018-02-09</a:t>
+              <a:t>2018-02-12</a:t>
             </a:fld>
             <a:endParaRPr lang="en-US"/>
           </a:p>
@@ -2070,7 +2727,7 @@
           <a:p>
             <a:fld id="{F03E57DB-E231-45C1-80AB-E8EAD4D6FBB2}" type="datetimeFigureOut">
               <a:rPr lang="en-US" smtClean="0"/>
-              <a:t>2018-02-09</a:t>
+              <a:t>2018-02-12</a:t>
             </a:fld>
             <a:endParaRPr lang="en-US"/>
           </a:p>
@@ -2381,7 +3038,7 @@
           <a:p>
             <a:fld id="{F03E57DB-E231-45C1-80AB-E8EAD4D6FBB2}" type="datetimeFigureOut">
               <a:rPr lang="en-US" smtClean="0"/>
-              <a:t>2018-02-09</a:t>
+              <a:t>2018-02-12</a:t>
             </a:fld>
             <a:endParaRPr lang="en-US"/>
           </a:p>
@@ -2669,7 +3326,7 @@
           <a:p>
             <a:fld id="{F03E57DB-E231-45C1-80AB-E8EAD4D6FBB2}" type="datetimeFigureOut">
               <a:rPr lang="en-US" smtClean="0"/>
-              <a:t>2018-02-09</a:t>
+              <a:t>2018-02-12</a:t>
             </a:fld>
             <a:endParaRPr lang="en-US"/>
           </a:p>
@@ -2910,7 +3567,7 @@
           <a:p>
             <a:fld id="{F03E57DB-E231-45C1-80AB-E8EAD4D6FBB2}" type="datetimeFigureOut">
               <a:rPr lang="en-US" smtClean="0"/>
-              <a:t>2018-02-09</a:t>
+              <a:t>2018-02-12</a:t>
             </a:fld>
             <a:endParaRPr lang="en-US"/>
           </a:p>
@@ -3474,7 +4131,7 @@
         </p:nvGraphicFramePr>
         <p:xfrm>
           <a:off x="2795913" y="4084320"/>
-          <a:ext cx="6600174" cy="2293695"/>
+          <a:ext cx="6600174" cy="2264739"/>
         </p:xfrm>
         <a:graphic>
           <a:graphicData uri="http://schemas.openxmlformats.org/drawingml/2006/table">
@@ -3771,7 +4428,7 @@
                   </a:ext>
                 </a:extLst>
               </a:tr>
-              <a:tr h="90289">
+              <a:tr h="0">
                 <a:tc>
                   <a:txBody>
                     <a:bodyPr/>
@@ -3966,6 +4623,978 @@
 </p:sld>
 </file>
 
+<file path=ppt/slides/slide10.xml><?xml version="1.0" encoding="utf-8"?>
+<p:sld xmlns:a="http://schemas.openxmlformats.org/drawingml/2006/main" xmlns:r="http://schemas.openxmlformats.org/officeDocument/2006/relationships" xmlns:p="http://schemas.openxmlformats.org/presentationml/2006/main">
+  <p:cSld>
+    <p:spTree>
+      <p:nvGrpSpPr>
+        <p:cNvPr id="1" name=""/>
+        <p:cNvGrpSpPr/>
+        <p:nvPr/>
+      </p:nvGrpSpPr>
+      <p:grpSpPr>
+        <a:xfrm>
+          <a:off x="0" y="0"/>
+          <a:ext cx="0" cy="0"/>
+          <a:chOff x="0" y="0"/>
+          <a:chExt cx="0" cy="0"/>
+        </a:xfrm>
+      </p:grpSpPr>
+      <p:sp>
+        <p:nvSpPr>
+          <p:cNvPr id="2" name="Title 1">
+            <a:extLst>
+              <a:ext uri="{FF2B5EF4-FFF2-40B4-BE49-F238E27FC236}">
+                <a16:creationId xmlns:a16="http://schemas.microsoft.com/office/drawing/2014/main" id="{343C1756-A42D-48FC-ACAC-DB98DD35A54B}"/>
+              </a:ext>
+            </a:extLst>
+          </p:cNvPr>
+          <p:cNvSpPr>
+            <a:spLocks noGrp="1"/>
+          </p:cNvSpPr>
+          <p:nvPr>
+            <p:ph type="title"/>
+          </p:nvPr>
+        </p:nvSpPr>
+        <p:spPr/>
+        <p:txBody>
+          <a:bodyPr/>
+          <a:lstStyle/>
+          <a:p>
+            <a:r>
+              <a:rPr lang="en-US" dirty="0"/>
+              <a:t>System Analysis and Design:</a:t>
+            </a:r>
+            <a:br>
+              <a:rPr lang="en-US" dirty="0"/>
+            </a:br>
+            <a:r>
+              <a:rPr lang="en-US" b="1" i="1" dirty="0"/>
+              <a:t>Functional Requirements</a:t>
+            </a:r>
+            <a:endParaRPr lang="en-US" dirty="0"/>
+          </a:p>
+        </p:txBody>
+      </p:sp>
+      <p:sp>
+        <p:nvSpPr>
+          <p:cNvPr id="3" name="Content Placeholder 2">
+            <a:extLst>
+              <a:ext uri="{FF2B5EF4-FFF2-40B4-BE49-F238E27FC236}">
+                <a16:creationId xmlns:a16="http://schemas.microsoft.com/office/drawing/2014/main" id="{123FB78C-973D-4FB8-91C3-023732E22C35}"/>
+              </a:ext>
+            </a:extLst>
+          </p:cNvPr>
+          <p:cNvSpPr>
+            <a:spLocks noGrp="1"/>
+          </p:cNvSpPr>
+          <p:nvPr>
+            <p:ph idx="1"/>
+          </p:nvPr>
+        </p:nvSpPr>
+        <p:spPr/>
+        <p:txBody>
+          <a:bodyPr>
+            <a:normAutofit fontScale="92500" lnSpcReduction="10000"/>
+          </a:bodyPr>
+          <a:lstStyle/>
+          <a:p>
+            <a:r>
+              <a:rPr lang="en-US" dirty="0"/>
+              <a:t>Each course will have a </a:t>
+            </a:r>
+            <a:r>
+              <a:rPr lang="en-US" u="sng" dirty="0"/>
+              <a:t>Q/A Forum</a:t>
+            </a:r>
+            <a:r>
+              <a:rPr lang="en-US" dirty="0"/>
+              <a:t>.  The course students can post in the course forum to ask a question (related to this course) and other students, professors and TAs can answer.</a:t>
+            </a:r>
+          </a:p>
+          <a:p>
+            <a:pPr marL="0" indent="0">
+              <a:buNone/>
+            </a:pPr>
+            <a:endParaRPr lang="en-US" dirty="0"/>
+          </a:p>
+          <a:p>
+            <a:pPr marL="0" indent="0">
+              <a:buNone/>
+            </a:pPr>
+            <a:r>
+              <a:rPr lang="en-US" b="1" u="sng" dirty="0">
+                <a:solidFill>
+                  <a:srgbClr val="FF0000"/>
+                </a:solidFill>
+              </a:rPr>
+              <a:t>EXTRA STUFF:</a:t>
+            </a:r>
+          </a:p>
+          <a:p>
+            <a:r>
+              <a:rPr lang="en-US" dirty="0"/>
+              <a:t>Tasks can be set to require students to </a:t>
+            </a:r>
+            <a:r>
+              <a:rPr lang="en-US" u="sng" dirty="0"/>
+              <a:t>upload their solutions</a:t>
+            </a:r>
+            <a:r>
+              <a:rPr lang="en-US" dirty="0"/>
+              <a:t>. Students need to upload their solutions before due date.</a:t>
+            </a:r>
+          </a:p>
+          <a:p>
+            <a:r>
+              <a:rPr lang="en-US" dirty="0"/>
+              <a:t>Students will get notifications regularly to </a:t>
+            </a:r>
+            <a:r>
+              <a:rPr lang="en-US" u="sng" dirty="0"/>
+              <a:t>remind</a:t>
+            </a:r>
+            <a:r>
+              <a:rPr lang="en-US" dirty="0"/>
+              <a:t> them of their tasks that has a near due date.</a:t>
+            </a:r>
+          </a:p>
+          <a:p>
+            <a:r>
+              <a:rPr lang="en-US" dirty="0"/>
+              <a:t>The app will allow users (professors, students or TAs) to send </a:t>
+            </a:r>
+            <a:r>
+              <a:rPr lang="en-US" u="sng" dirty="0"/>
+              <a:t>direct private messages</a:t>
+            </a:r>
+            <a:r>
+              <a:rPr lang="en-US" dirty="0"/>
+              <a:t> to any other user.</a:t>
+            </a:r>
+          </a:p>
+          <a:p>
+            <a:endParaRPr lang="en-US" dirty="0"/>
+          </a:p>
+        </p:txBody>
+      </p:sp>
+    </p:spTree>
+    <p:extLst>
+      <p:ext uri="{BB962C8B-B14F-4D97-AF65-F5344CB8AC3E}">
+        <p14:creationId xmlns:p14="http://schemas.microsoft.com/office/powerpoint/2010/main" val="252675423"/>
+      </p:ext>
+    </p:extLst>
+  </p:cSld>
+  <p:clrMapOvr>
+    <a:masterClrMapping/>
+  </p:clrMapOvr>
+</p:sld>
+</file>
+
+<file path=ppt/slides/slide11.xml><?xml version="1.0" encoding="utf-8"?>
+<p:sld xmlns:a="http://schemas.openxmlformats.org/drawingml/2006/main" xmlns:r="http://schemas.openxmlformats.org/officeDocument/2006/relationships" xmlns:p="http://schemas.openxmlformats.org/presentationml/2006/main">
+  <p:cSld>
+    <p:spTree>
+      <p:nvGrpSpPr>
+        <p:cNvPr id="1" name=""/>
+        <p:cNvGrpSpPr/>
+        <p:nvPr/>
+      </p:nvGrpSpPr>
+      <p:grpSpPr>
+        <a:xfrm>
+          <a:off x="0" y="0"/>
+          <a:ext cx="0" cy="0"/>
+          <a:chOff x="0" y="0"/>
+          <a:chExt cx="0" cy="0"/>
+        </a:xfrm>
+      </p:grpSpPr>
+      <p:sp>
+        <p:nvSpPr>
+          <p:cNvPr id="2" name="Title 1">
+            <a:extLst>
+              <a:ext uri="{FF2B5EF4-FFF2-40B4-BE49-F238E27FC236}">
+                <a16:creationId xmlns:a16="http://schemas.microsoft.com/office/drawing/2014/main" id="{FC0C338E-24EC-4CC1-A549-916F3734B8C7}"/>
+              </a:ext>
+            </a:extLst>
+          </p:cNvPr>
+          <p:cNvSpPr>
+            <a:spLocks noGrp="1"/>
+          </p:cNvSpPr>
+          <p:nvPr>
+            <p:ph type="title"/>
+          </p:nvPr>
+        </p:nvSpPr>
+        <p:spPr/>
+        <p:txBody>
+          <a:bodyPr/>
+          <a:lstStyle/>
+          <a:p>
+            <a:r>
+              <a:rPr lang="en-US" dirty="0"/>
+              <a:t>System Analysis and Design:</a:t>
+            </a:r>
+            <a:br>
+              <a:rPr lang="en-US" dirty="0"/>
+            </a:br>
+            <a:r>
+              <a:rPr lang="en-US" b="1" i="1" dirty="0"/>
+              <a:t>Non-functional Requirements</a:t>
+            </a:r>
+          </a:p>
+        </p:txBody>
+      </p:sp>
+      <p:sp>
+        <p:nvSpPr>
+          <p:cNvPr id="3" name="Content Placeholder 2">
+            <a:extLst>
+              <a:ext uri="{FF2B5EF4-FFF2-40B4-BE49-F238E27FC236}">
+                <a16:creationId xmlns:a16="http://schemas.microsoft.com/office/drawing/2014/main" id="{99F9BB2E-7B4E-4994-A560-D4CE9F9D1405}"/>
+              </a:ext>
+            </a:extLst>
+          </p:cNvPr>
+          <p:cNvSpPr>
+            <a:spLocks noGrp="1"/>
+          </p:cNvSpPr>
+          <p:nvPr>
+            <p:ph idx="1"/>
+          </p:nvPr>
+        </p:nvSpPr>
+        <p:spPr/>
+        <p:txBody>
+          <a:bodyPr/>
+          <a:lstStyle/>
+          <a:p>
+            <a:endParaRPr lang="en-US"/>
+          </a:p>
+        </p:txBody>
+      </p:sp>
+    </p:spTree>
+    <p:extLst>
+      <p:ext uri="{BB962C8B-B14F-4D97-AF65-F5344CB8AC3E}">
+        <p14:creationId xmlns:p14="http://schemas.microsoft.com/office/powerpoint/2010/main" val="1712352762"/>
+      </p:ext>
+    </p:extLst>
+  </p:cSld>
+  <p:clrMapOvr>
+    <a:masterClrMapping/>
+  </p:clrMapOvr>
+</p:sld>
+</file>
+
+<file path=ppt/slides/slide12.xml><?xml version="1.0" encoding="utf-8"?>
+<p:sld xmlns:a="http://schemas.openxmlformats.org/drawingml/2006/main" xmlns:r="http://schemas.openxmlformats.org/officeDocument/2006/relationships" xmlns:p="http://schemas.openxmlformats.org/presentationml/2006/main">
+  <p:cSld>
+    <p:spTree>
+      <p:nvGrpSpPr>
+        <p:cNvPr id="1" name=""/>
+        <p:cNvGrpSpPr/>
+        <p:nvPr/>
+      </p:nvGrpSpPr>
+      <p:grpSpPr>
+        <a:xfrm>
+          <a:off x="0" y="0"/>
+          <a:ext cx="0" cy="0"/>
+          <a:chOff x="0" y="0"/>
+          <a:chExt cx="0" cy="0"/>
+        </a:xfrm>
+      </p:grpSpPr>
+      <p:sp>
+        <p:nvSpPr>
+          <p:cNvPr id="2" name="Title 1">
+            <a:extLst>
+              <a:ext uri="{FF2B5EF4-FFF2-40B4-BE49-F238E27FC236}">
+                <a16:creationId xmlns:a16="http://schemas.microsoft.com/office/drawing/2014/main" id="{BA7DC1FB-0A2E-4919-A73D-0288CA91EDC8}"/>
+              </a:ext>
+            </a:extLst>
+          </p:cNvPr>
+          <p:cNvSpPr>
+            <a:spLocks noGrp="1"/>
+          </p:cNvSpPr>
+          <p:nvPr>
+            <p:ph type="title"/>
+          </p:nvPr>
+        </p:nvSpPr>
+        <p:spPr/>
+        <p:txBody>
+          <a:bodyPr/>
+          <a:lstStyle/>
+          <a:p>
+            <a:r>
+              <a:rPr lang="en-US" dirty="0"/>
+              <a:t>System Analysis and Design:</a:t>
+            </a:r>
+            <a:br>
+              <a:rPr lang="en-US" dirty="0"/>
+            </a:br>
+            <a:r>
+              <a:rPr lang="en-US" b="1" i="1" dirty="0"/>
+              <a:t>Use-case Diagram</a:t>
+            </a:r>
+          </a:p>
+        </p:txBody>
+      </p:sp>
+      <p:sp>
+        <p:nvSpPr>
+          <p:cNvPr id="3" name="Content Placeholder 2">
+            <a:extLst>
+              <a:ext uri="{FF2B5EF4-FFF2-40B4-BE49-F238E27FC236}">
+                <a16:creationId xmlns:a16="http://schemas.microsoft.com/office/drawing/2014/main" id="{5B072782-52A3-4E86-A8D0-D679B90EEE02}"/>
+              </a:ext>
+            </a:extLst>
+          </p:cNvPr>
+          <p:cNvSpPr>
+            <a:spLocks noGrp="1"/>
+          </p:cNvSpPr>
+          <p:nvPr>
+            <p:ph idx="1"/>
+          </p:nvPr>
+        </p:nvSpPr>
+        <p:spPr/>
+        <p:txBody>
+          <a:bodyPr/>
+          <a:lstStyle/>
+          <a:p>
+            <a:endParaRPr lang="en-US"/>
+          </a:p>
+        </p:txBody>
+      </p:sp>
+    </p:spTree>
+    <p:extLst>
+      <p:ext uri="{BB962C8B-B14F-4D97-AF65-F5344CB8AC3E}">
+        <p14:creationId xmlns:p14="http://schemas.microsoft.com/office/powerpoint/2010/main" val="3367842003"/>
+      </p:ext>
+    </p:extLst>
+  </p:cSld>
+  <p:clrMapOvr>
+    <a:masterClrMapping/>
+  </p:clrMapOvr>
+</p:sld>
+</file>
+
+<file path=ppt/slides/slide13.xml><?xml version="1.0" encoding="utf-8"?>
+<p:sld xmlns:a="http://schemas.openxmlformats.org/drawingml/2006/main" xmlns:r="http://schemas.openxmlformats.org/officeDocument/2006/relationships" xmlns:p="http://schemas.openxmlformats.org/presentationml/2006/main">
+  <p:cSld>
+    <p:spTree>
+      <p:nvGrpSpPr>
+        <p:cNvPr id="1" name=""/>
+        <p:cNvGrpSpPr/>
+        <p:nvPr/>
+      </p:nvGrpSpPr>
+      <p:grpSpPr>
+        <a:xfrm>
+          <a:off x="0" y="0"/>
+          <a:ext cx="0" cy="0"/>
+          <a:chOff x="0" y="0"/>
+          <a:chExt cx="0" cy="0"/>
+        </a:xfrm>
+      </p:grpSpPr>
+      <p:sp>
+        <p:nvSpPr>
+          <p:cNvPr id="2" name="Title 1">
+            <a:extLst>
+              <a:ext uri="{FF2B5EF4-FFF2-40B4-BE49-F238E27FC236}">
+                <a16:creationId xmlns:a16="http://schemas.microsoft.com/office/drawing/2014/main" id="{97370C67-DFE9-401B-9887-5D961CC2D9B4}"/>
+              </a:ext>
+            </a:extLst>
+          </p:cNvPr>
+          <p:cNvSpPr>
+            <a:spLocks noGrp="1"/>
+          </p:cNvSpPr>
+          <p:nvPr>
+            <p:ph type="title"/>
+          </p:nvPr>
+        </p:nvSpPr>
+        <p:spPr/>
+        <p:txBody>
+          <a:bodyPr/>
+          <a:lstStyle/>
+          <a:p>
+            <a:r>
+              <a:rPr lang="en-US" dirty="0"/>
+              <a:t>System Analysis and Design:</a:t>
+            </a:r>
+            <a:br>
+              <a:rPr lang="en-US" dirty="0"/>
+            </a:br>
+            <a:r>
+              <a:rPr lang="en-US" b="1" i="1" dirty="0"/>
+              <a:t>Sample Use-cases</a:t>
+            </a:r>
+          </a:p>
+        </p:txBody>
+      </p:sp>
+      <p:sp>
+        <p:nvSpPr>
+          <p:cNvPr id="3" name="Content Placeholder 2">
+            <a:extLst>
+              <a:ext uri="{FF2B5EF4-FFF2-40B4-BE49-F238E27FC236}">
+                <a16:creationId xmlns:a16="http://schemas.microsoft.com/office/drawing/2014/main" id="{5932C0FF-2126-40C7-B981-A1B8A848A860}"/>
+              </a:ext>
+            </a:extLst>
+          </p:cNvPr>
+          <p:cNvSpPr>
+            <a:spLocks noGrp="1"/>
+          </p:cNvSpPr>
+          <p:nvPr>
+            <p:ph idx="1"/>
+          </p:nvPr>
+        </p:nvSpPr>
+        <p:spPr/>
+        <p:txBody>
+          <a:bodyPr/>
+          <a:lstStyle/>
+          <a:p>
+            <a:endParaRPr lang="en-US"/>
+          </a:p>
+        </p:txBody>
+      </p:sp>
+    </p:spTree>
+    <p:extLst>
+      <p:ext uri="{BB962C8B-B14F-4D97-AF65-F5344CB8AC3E}">
+        <p14:creationId xmlns:p14="http://schemas.microsoft.com/office/powerpoint/2010/main" val="1246936581"/>
+      </p:ext>
+    </p:extLst>
+  </p:cSld>
+  <p:clrMapOvr>
+    <a:masterClrMapping/>
+  </p:clrMapOvr>
+</p:sld>
+</file>
+
+<file path=ppt/slides/slide14.xml><?xml version="1.0" encoding="utf-8"?>
+<p:sld xmlns:a="http://schemas.openxmlformats.org/drawingml/2006/main" xmlns:r="http://schemas.openxmlformats.org/officeDocument/2006/relationships" xmlns:p="http://schemas.openxmlformats.org/presentationml/2006/main">
+  <p:cSld>
+    <p:spTree>
+      <p:nvGrpSpPr>
+        <p:cNvPr id="1" name=""/>
+        <p:cNvGrpSpPr/>
+        <p:nvPr/>
+      </p:nvGrpSpPr>
+      <p:grpSpPr>
+        <a:xfrm>
+          <a:off x="0" y="0"/>
+          <a:ext cx="0" cy="0"/>
+          <a:chOff x="0" y="0"/>
+          <a:chExt cx="0" cy="0"/>
+        </a:xfrm>
+      </p:grpSpPr>
+      <p:sp>
+        <p:nvSpPr>
+          <p:cNvPr id="2" name="Title 1">
+            <a:extLst>
+              <a:ext uri="{FF2B5EF4-FFF2-40B4-BE49-F238E27FC236}">
+                <a16:creationId xmlns:a16="http://schemas.microsoft.com/office/drawing/2014/main" id="{E456F741-3156-4B5B-9821-D8A1040D1FD7}"/>
+              </a:ext>
+            </a:extLst>
+          </p:cNvPr>
+          <p:cNvSpPr>
+            <a:spLocks noGrp="1"/>
+          </p:cNvSpPr>
+          <p:nvPr>
+            <p:ph type="title"/>
+          </p:nvPr>
+        </p:nvSpPr>
+        <p:spPr/>
+        <p:txBody>
+          <a:bodyPr/>
+          <a:lstStyle/>
+          <a:p>
+            <a:r>
+              <a:rPr lang="en-US" dirty="0"/>
+              <a:t>System Analysis and Design:</a:t>
+            </a:r>
+            <a:br>
+              <a:rPr lang="en-US" dirty="0"/>
+            </a:br>
+            <a:r>
+              <a:rPr lang="en-US" b="1" i="1" dirty="0"/>
+              <a:t>Class Diagram</a:t>
+            </a:r>
+          </a:p>
+        </p:txBody>
+      </p:sp>
+      <p:sp>
+        <p:nvSpPr>
+          <p:cNvPr id="3" name="Content Placeholder 2">
+            <a:extLst>
+              <a:ext uri="{FF2B5EF4-FFF2-40B4-BE49-F238E27FC236}">
+                <a16:creationId xmlns:a16="http://schemas.microsoft.com/office/drawing/2014/main" id="{69069EBF-DD3F-46E7-B926-A5ECCC1CA779}"/>
+              </a:ext>
+            </a:extLst>
+          </p:cNvPr>
+          <p:cNvSpPr>
+            <a:spLocks noGrp="1"/>
+          </p:cNvSpPr>
+          <p:nvPr>
+            <p:ph idx="1"/>
+          </p:nvPr>
+        </p:nvSpPr>
+        <p:spPr/>
+        <p:txBody>
+          <a:bodyPr/>
+          <a:lstStyle/>
+          <a:p>
+            <a:endParaRPr lang="en-US"/>
+          </a:p>
+        </p:txBody>
+      </p:sp>
+    </p:spTree>
+    <p:extLst>
+      <p:ext uri="{BB962C8B-B14F-4D97-AF65-F5344CB8AC3E}">
+        <p14:creationId xmlns:p14="http://schemas.microsoft.com/office/powerpoint/2010/main" val="2435862304"/>
+      </p:ext>
+    </p:extLst>
+  </p:cSld>
+  <p:clrMapOvr>
+    <a:masterClrMapping/>
+  </p:clrMapOvr>
+</p:sld>
+</file>
+
+<file path=ppt/slides/slide15.xml><?xml version="1.0" encoding="utf-8"?>
+<p:sld xmlns:a="http://schemas.openxmlformats.org/drawingml/2006/main" xmlns:r="http://schemas.openxmlformats.org/officeDocument/2006/relationships" xmlns:p="http://schemas.openxmlformats.org/presentationml/2006/main">
+  <p:cSld>
+    <p:spTree>
+      <p:nvGrpSpPr>
+        <p:cNvPr id="1" name=""/>
+        <p:cNvGrpSpPr/>
+        <p:nvPr/>
+      </p:nvGrpSpPr>
+      <p:grpSpPr>
+        <a:xfrm>
+          <a:off x="0" y="0"/>
+          <a:ext cx="0" cy="0"/>
+          <a:chOff x="0" y="0"/>
+          <a:chExt cx="0" cy="0"/>
+        </a:xfrm>
+      </p:grpSpPr>
+      <p:sp>
+        <p:nvSpPr>
+          <p:cNvPr id="2" name="Title 1">
+            <a:extLst>
+              <a:ext uri="{FF2B5EF4-FFF2-40B4-BE49-F238E27FC236}">
+                <a16:creationId xmlns:a16="http://schemas.microsoft.com/office/drawing/2014/main" id="{69A192F9-69C3-4384-83A1-DF45AA6108D3}"/>
+              </a:ext>
+            </a:extLst>
+          </p:cNvPr>
+          <p:cNvSpPr>
+            <a:spLocks noGrp="1"/>
+          </p:cNvSpPr>
+          <p:nvPr>
+            <p:ph type="title"/>
+          </p:nvPr>
+        </p:nvSpPr>
+        <p:spPr/>
+        <p:txBody>
+          <a:bodyPr/>
+          <a:lstStyle/>
+          <a:p>
+            <a:r>
+              <a:rPr lang="en-US" dirty="0"/>
+              <a:t>System Analysis and Design:</a:t>
+            </a:r>
+            <a:br>
+              <a:rPr lang="en-US" dirty="0"/>
+            </a:br>
+            <a:r>
+              <a:rPr lang="en-US" b="1" i="1" dirty="0"/>
+              <a:t>Sequence Diagram</a:t>
+            </a:r>
+          </a:p>
+        </p:txBody>
+      </p:sp>
+      <p:sp>
+        <p:nvSpPr>
+          <p:cNvPr id="3" name="Content Placeholder 2">
+            <a:extLst>
+              <a:ext uri="{FF2B5EF4-FFF2-40B4-BE49-F238E27FC236}">
+                <a16:creationId xmlns:a16="http://schemas.microsoft.com/office/drawing/2014/main" id="{607B6DD0-5ED9-4339-A4CF-E450533BF5CB}"/>
+              </a:ext>
+            </a:extLst>
+          </p:cNvPr>
+          <p:cNvSpPr>
+            <a:spLocks noGrp="1"/>
+          </p:cNvSpPr>
+          <p:nvPr>
+            <p:ph idx="1"/>
+          </p:nvPr>
+        </p:nvSpPr>
+        <p:spPr/>
+        <p:txBody>
+          <a:bodyPr/>
+          <a:lstStyle/>
+          <a:p>
+            <a:endParaRPr lang="en-US"/>
+          </a:p>
+        </p:txBody>
+      </p:sp>
+    </p:spTree>
+    <p:extLst>
+      <p:ext uri="{BB962C8B-B14F-4D97-AF65-F5344CB8AC3E}">
+        <p14:creationId xmlns:p14="http://schemas.microsoft.com/office/powerpoint/2010/main" val="4209192187"/>
+      </p:ext>
+    </p:extLst>
+  </p:cSld>
+  <p:clrMapOvr>
+    <a:masterClrMapping/>
+  </p:clrMapOvr>
+</p:sld>
+</file>
+
+<file path=ppt/slides/slide16.xml><?xml version="1.0" encoding="utf-8"?>
+<p:sld xmlns:a="http://schemas.openxmlformats.org/drawingml/2006/main" xmlns:r="http://schemas.openxmlformats.org/officeDocument/2006/relationships" xmlns:p="http://schemas.openxmlformats.org/presentationml/2006/main">
+  <p:cSld>
+    <p:spTree>
+      <p:nvGrpSpPr>
+        <p:cNvPr id="1" name=""/>
+        <p:cNvGrpSpPr/>
+        <p:nvPr/>
+      </p:nvGrpSpPr>
+      <p:grpSpPr>
+        <a:xfrm>
+          <a:off x="0" y="0"/>
+          <a:ext cx="0" cy="0"/>
+          <a:chOff x="0" y="0"/>
+          <a:chExt cx="0" cy="0"/>
+        </a:xfrm>
+      </p:grpSpPr>
+      <p:sp>
+        <p:nvSpPr>
+          <p:cNvPr id="2" name="Title 1">
+            <a:extLst>
+              <a:ext uri="{FF2B5EF4-FFF2-40B4-BE49-F238E27FC236}">
+                <a16:creationId xmlns:a16="http://schemas.microsoft.com/office/drawing/2014/main" id="{45D222C1-98F0-4EDE-A83E-A584E0E1A15B}"/>
+              </a:ext>
+            </a:extLst>
+          </p:cNvPr>
+          <p:cNvSpPr>
+            <a:spLocks noGrp="1"/>
+          </p:cNvSpPr>
+          <p:nvPr>
+            <p:ph type="title"/>
+          </p:nvPr>
+        </p:nvSpPr>
+        <p:spPr/>
+        <p:txBody>
+          <a:bodyPr/>
+          <a:lstStyle/>
+          <a:p>
+            <a:r>
+              <a:rPr lang="en-US" dirty="0"/>
+              <a:t>System Analysis and Design:</a:t>
+            </a:r>
+            <a:br>
+              <a:rPr lang="en-US" dirty="0"/>
+            </a:br>
+            <a:r>
+              <a:rPr lang="en-US" b="1" i="1" dirty="0"/>
+              <a:t>ERD</a:t>
+            </a:r>
+            <a:endParaRPr lang="en-US" dirty="0"/>
+          </a:p>
+        </p:txBody>
+      </p:sp>
+      <p:sp>
+        <p:nvSpPr>
+          <p:cNvPr id="3" name="Content Placeholder 2">
+            <a:extLst>
+              <a:ext uri="{FF2B5EF4-FFF2-40B4-BE49-F238E27FC236}">
+                <a16:creationId xmlns:a16="http://schemas.microsoft.com/office/drawing/2014/main" id="{CF447897-BA36-4F4F-9C82-3D2916C0EFBE}"/>
+              </a:ext>
+            </a:extLst>
+          </p:cNvPr>
+          <p:cNvSpPr>
+            <a:spLocks noGrp="1"/>
+          </p:cNvSpPr>
+          <p:nvPr>
+            <p:ph idx="1"/>
+          </p:nvPr>
+        </p:nvSpPr>
+        <p:spPr/>
+        <p:txBody>
+          <a:bodyPr/>
+          <a:lstStyle/>
+          <a:p>
+            <a:endParaRPr lang="en-US"/>
+          </a:p>
+        </p:txBody>
+      </p:sp>
+    </p:spTree>
+    <p:extLst>
+      <p:ext uri="{BB962C8B-B14F-4D97-AF65-F5344CB8AC3E}">
+        <p14:creationId xmlns:p14="http://schemas.microsoft.com/office/powerpoint/2010/main" val="1136665364"/>
+      </p:ext>
+    </p:extLst>
+  </p:cSld>
+  <p:clrMapOvr>
+    <a:masterClrMapping/>
+  </p:clrMapOvr>
+</p:sld>
+</file>
+
+<file path=ppt/slides/slide17.xml><?xml version="1.0" encoding="utf-8"?>
+<p:sld xmlns:a="http://schemas.openxmlformats.org/drawingml/2006/main" xmlns:r="http://schemas.openxmlformats.org/officeDocument/2006/relationships" xmlns:p="http://schemas.openxmlformats.org/presentationml/2006/main">
+  <p:cSld>
+    <p:spTree>
+      <p:nvGrpSpPr>
+        <p:cNvPr id="1" name=""/>
+        <p:cNvGrpSpPr/>
+        <p:nvPr/>
+      </p:nvGrpSpPr>
+      <p:grpSpPr>
+        <a:xfrm>
+          <a:off x="0" y="0"/>
+          <a:ext cx="0" cy="0"/>
+          <a:chOff x="0" y="0"/>
+          <a:chExt cx="0" cy="0"/>
+        </a:xfrm>
+      </p:grpSpPr>
+      <p:sp>
+        <p:nvSpPr>
+          <p:cNvPr id="2" name="Title 1">
+            <a:extLst>
+              <a:ext uri="{FF2B5EF4-FFF2-40B4-BE49-F238E27FC236}">
+                <a16:creationId xmlns:a16="http://schemas.microsoft.com/office/drawing/2014/main" id="{37C2E81E-8C30-4420-81C2-9F95C4C74AD5}"/>
+              </a:ext>
+            </a:extLst>
+          </p:cNvPr>
+          <p:cNvSpPr>
+            <a:spLocks noGrp="1"/>
+          </p:cNvSpPr>
+          <p:nvPr>
+            <p:ph type="title"/>
+          </p:nvPr>
+        </p:nvSpPr>
+        <p:spPr/>
+        <p:txBody>
+          <a:bodyPr/>
+          <a:lstStyle/>
+          <a:p>
+            <a:r>
+              <a:rPr lang="en-US" dirty="0"/>
+              <a:t>Draft of screenshots of expected system screens</a:t>
+            </a:r>
+          </a:p>
+        </p:txBody>
+      </p:sp>
+      <p:sp>
+        <p:nvSpPr>
+          <p:cNvPr id="3" name="Content Placeholder 2">
+            <a:extLst>
+              <a:ext uri="{FF2B5EF4-FFF2-40B4-BE49-F238E27FC236}">
+                <a16:creationId xmlns:a16="http://schemas.microsoft.com/office/drawing/2014/main" id="{9EBA160E-CD0F-482F-A84F-B21823BFC8B4}"/>
+              </a:ext>
+            </a:extLst>
+          </p:cNvPr>
+          <p:cNvSpPr>
+            <a:spLocks noGrp="1"/>
+          </p:cNvSpPr>
+          <p:nvPr>
+            <p:ph idx="1"/>
+          </p:nvPr>
+        </p:nvSpPr>
+        <p:spPr/>
+        <p:txBody>
+          <a:bodyPr>
+            <a:normAutofit/>
+          </a:bodyPr>
+          <a:lstStyle/>
+          <a:p>
+            <a:pPr marL="0" indent="0">
+              <a:buNone/>
+            </a:pPr>
+            <a:endParaRPr lang="en-US" sz="4000" dirty="0"/>
+          </a:p>
+        </p:txBody>
+      </p:sp>
+    </p:spTree>
+    <p:extLst>
+      <p:ext uri="{BB962C8B-B14F-4D97-AF65-F5344CB8AC3E}">
+        <p14:creationId xmlns:p14="http://schemas.microsoft.com/office/powerpoint/2010/main" val="3149044935"/>
+      </p:ext>
+    </p:extLst>
+  </p:cSld>
+  <p:clrMapOvr>
+    <a:masterClrMapping/>
+  </p:clrMapOvr>
+</p:sld>
+</file>
+
+<file path=ppt/slides/slide18.xml><?xml version="1.0" encoding="utf-8"?>
+<p:sld xmlns:a="http://schemas.openxmlformats.org/drawingml/2006/main" xmlns:r="http://schemas.openxmlformats.org/officeDocument/2006/relationships" xmlns:p="http://schemas.openxmlformats.org/presentationml/2006/main">
+  <p:cSld>
+    <p:spTree>
+      <p:nvGrpSpPr>
+        <p:cNvPr id="1" name=""/>
+        <p:cNvGrpSpPr/>
+        <p:nvPr/>
+      </p:nvGrpSpPr>
+      <p:grpSpPr>
+        <a:xfrm>
+          <a:off x="0" y="0"/>
+          <a:ext cx="0" cy="0"/>
+          <a:chOff x="0" y="0"/>
+          <a:chExt cx="0" cy="0"/>
+        </a:xfrm>
+      </p:grpSpPr>
+      <p:sp>
+        <p:nvSpPr>
+          <p:cNvPr id="2" name="Title 1">
+            <a:extLst>
+              <a:ext uri="{FF2B5EF4-FFF2-40B4-BE49-F238E27FC236}">
+                <a16:creationId xmlns:a16="http://schemas.microsoft.com/office/drawing/2014/main" id="{0FB259C1-57F3-45E4-AC63-2DB1D7422228}"/>
+              </a:ext>
+            </a:extLst>
+          </p:cNvPr>
+          <p:cNvSpPr>
+            <a:spLocks noGrp="1"/>
+          </p:cNvSpPr>
+          <p:nvPr>
+            <p:ph type="title"/>
+          </p:nvPr>
+        </p:nvSpPr>
+        <p:spPr/>
+        <p:txBody>
+          <a:bodyPr/>
+          <a:lstStyle/>
+          <a:p>
+            <a:r>
+              <a:rPr lang="en-US" dirty="0"/>
+              <a:t>Time Plan</a:t>
+            </a:r>
+          </a:p>
+        </p:txBody>
+      </p:sp>
+      <p:sp>
+        <p:nvSpPr>
+          <p:cNvPr id="3" name="Content Placeholder 2">
+            <a:extLst>
+              <a:ext uri="{FF2B5EF4-FFF2-40B4-BE49-F238E27FC236}">
+                <a16:creationId xmlns:a16="http://schemas.microsoft.com/office/drawing/2014/main" id="{0703150A-F7E2-4A79-8DE3-22649BE46A1D}"/>
+              </a:ext>
+            </a:extLst>
+          </p:cNvPr>
+          <p:cNvSpPr>
+            <a:spLocks noGrp="1"/>
+          </p:cNvSpPr>
+          <p:nvPr>
+            <p:ph idx="1"/>
+          </p:nvPr>
+        </p:nvSpPr>
+        <p:spPr/>
+        <p:txBody>
+          <a:bodyPr/>
+          <a:lstStyle/>
+          <a:p>
+            <a:r>
+              <a:rPr lang="en-US" dirty="0"/>
+              <a:t>For the tasks fulfilled in previous 4 months</a:t>
+            </a:r>
+          </a:p>
+          <a:p>
+            <a:r>
+              <a:rPr lang="en-US" dirty="0"/>
+              <a:t>For the tasks to be fulfilled in the next 4 Months</a:t>
+            </a:r>
+          </a:p>
+        </p:txBody>
+      </p:sp>
+    </p:spTree>
+    <p:extLst>
+      <p:ext uri="{BB962C8B-B14F-4D97-AF65-F5344CB8AC3E}">
+        <p14:creationId xmlns:p14="http://schemas.microsoft.com/office/powerpoint/2010/main" val="609484539"/>
+      </p:ext>
+    </p:extLst>
+  </p:cSld>
+  <p:clrMapOvr>
+    <a:masterClrMapping/>
+  </p:clrMapOvr>
+</p:sld>
+</file>
+
+<file path=ppt/slides/slide19.xml><?xml version="1.0" encoding="utf-8"?>
+<p:sld xmlns:a="http://schemas.openxmlformats.org/drawingml/2006/main" xmlns:r="http://schemas.openxmlformats.org/officeDocument/2006/relationships" xmlns:p="http://schemas.openxmlformats.org/presentationml/2006/main">
+  <p:cSld>
+    <p:spTree>
+      <p:nvGrpSpPr>
+        <p:cNvPr id="1" name=""/>
+        <p:cNvGrpSpPr/>
+        <p:nvPr/>
+      </p:nvGrpSpPr>
+      <p:grpSpPr>
+        <a:xfrm>
+          <a:off x="0" y="0"/>
+          <a:ext cx="0" cy="0"/>
+          <a:chOff x="0" y="0"/>
+          <a:chExt cx="0" cy="0"/>
+        </a:xfrm>
+      </p:grpSpPr>
+      <p:sp>
+        <p:nvSpPr>
+          <p:cNvPr id="2" name="Title 1">
+            <a:extLst>
+              <a:ext uri="{FF2B5EF4-FFF2-40B4-BE49-F238E27FC236}">
+                <a16:creationId xmlns:a16="http://schemas.microsoft.com/office/drawing/2014/main" id="{A672E45D-E657-4BB8-87D1-0EDABB4693E9}"/>
+              </a:ext>
+            </a:extLst>
+          </p:cNvPr>
+          <p:cNvSpPr>
+            <a:spLocks noGrp="1"/>
+          </p:cNvSpPr>
+          <p:nvPr>
+            <p:ph type="title"/>
+          </p:nvPr>
+        </p:nvSpPr>
+        <p:spPr/>
+        <p:txBody>
+          <a:bodyPr/>
+          <a:lstStyle/>
+          <a:p>
+            <a:r>
+              <a:rPr lang="en-US" dirty="0"/>
+              <a:t>Conclusion</a:t>
+            </a:r>
+          </a:p>
+        </p:txBody>
+      </p:sp>
+      <p:sp>
+        <p:nvSpPr>
+          <p:cNvPr id="3" name="Content Placeholder 2">
+            <a:extLst>
+              <a:ext uri="{FF2B5EF4-FFF2-40B4-BE49-F238E27FC236}">
+                <a16:creationId xmlns:a16="http://schemas.microsoft.com/office/drawing/2014/main" id="{A9A8A72B-7CA0-4BDC-8C1B-5F6308907B91}"/>
+              </a:ext>
+            </a:extLst>
+          </p:cNvPr>
+          <p:cNvSpPr>
+            <a:spLocks noGrp="1"/>
+          </p:cNvSpPr>
+          <p:nvPr>
+            <p:ph idx="1"/>
+          </p:nvPr>
+        </p:nvSpPr>
+        <p:spPr/>
+        <p:txBody>
+          <a:bodyPr/>
+          <a:lstStyle/>
+          <a:p>
+            <a:endParaRPr lang="en-US"/>
+          </a:p>
+        </p:txBody>
+      </p:sp>
+    </p:spTree>
+    <p:extLst>
+      <p:ext uri="{BB962C8B-B14F-4D97-AF65-F5344CB8AC3E}">
+        <p14:creationId xmlns:p14="http://schemas.microsoft.com/office/powerpoint/2010/main" val="519845742"/>
+      </p:ext>
+    </p:extLst>
+  </p:cSld>
+  <p:clrMapOvr>
+    <a:masterClrMapping/>
+  </p:clrMapOvr>
+</p:sld>
+</file>
+
 <file path=ppt/slides/slide2.xml><?xml version="1.0" encoding="utf-8"?>
 <p:sld xmlns:a="http://schemas.openxmlformats.org/drawingml/2006/main" xmlns:r="http://schemas.openxmlformats.org/officeDocument/2006/relationships" xmlns:p="http://schemas.openxmlformats.org/presentationml/2006/main">
   <p:cSld>
@@ -4031,6 +5660,50 @@
         <p:txBody>
           <a:bodyPr/>
           <a:lstStyle/>
+          <a:p>
+            <a:r>
+              <a:rPr lang="en-US" sz="3600" b="1" dirty="0">
+                <a:solidFill>
+                  <a:srgbClr val="FF0000"/>
+                </a:solidFill>
+              </a:rPr>
+              <a:t>FCI E-campus: </a:t>
+            </a:r>
+            <a:r>
+              <a:rPr lang="en-US" sz="3600" b="1" dirty="0"/>
+              <a:t>Timetable &amp; Materials Organizer.</a:t>
+            </a:r>
+          </a:p>
+          <a:p>
+            <a:r>
+              <a:rPr lang="en-US" dirty="0"/>
+              <a:t>Our app helps students stay organized by providing them with their schedule, depending on what courses they have registered.</a:t>
+            </a:r>
+          </a:p>
+          <a:p>
+            <a:r>
+              <a:rPr lang="en-US" dirty="0"/>
+              <a:t>It also notify them for new announcements, upcoming quizzes and assignments deliveries to help them keep track with their courses.</a:t>
+            </a:r>
+          </a:p>
+          <a:p>
+            <a:r>
+              <a:rPr lang="en-US" dirty="0"/>
+              <a:t>The app will organize downloading and uploading materials.</a:t>
+            </a:r>
+          </a:p>
+          <a:p>
+            <a:r>
+              <a:rPr lang="en-US" dirty="0"/>
+              <a:t>That’s not it, the app will provide a forum for the students to communicate with each other.</a:t>
+            </a:r>
+          </a:p>
+          <a:p>
+            <a:r>
+              <a:rPr lang="en-US" dirty="0"/>
+              <a:t>And many, many more.</a:t>
+            </a:r>
+          </a:p>
           <a:p>
             <a:endParaRPr lang="en-US" dirty="0"/>
           </a:p>
@@ -4071,7 +5744,7 @@
           <p:cNvPr id="2" name="Title 1">
             <a:extLst>
               <a:ext uri="{FF2B5EF4-FFF2-40B4-BE49-F238E27FC236}">
-                <a16:creationId xmlns:a16="http://schemas.microsoft.com/office/drawing/2014/main" id="{8CC3C86C-8969-4A41-9D76-5E68C9650353}"/>
+                <a16:creationId xmlns:a16="http://schemas.microsoft.com/office/drawing/2014/main" id="{81C58085-4265-46BF-B38D-4A6442430027}"/>
               </a:ext>
             </a:extLst>
           </p:cNvPr>
@@ -4089,7 +5762,7 @@
           <a:p>
             <a:r>
               <a:rPr lang="en-US" dirty="0"/>
-              <a:t>Problem significance</a:t>
+              <a:t>Project idea</a:t>
             </a:r>
           </a:p>
         </p:txBody>
@@ -4099,7 +5772,7 @@
           <p:cNvPr id="3" name="Content Placeholder 2">
             <a:extLst>
               <a:ext uri="{FF2B5EF4-FFF2-40B4-BE49-F238E27FC236}">
-                <a16:creationId xmlns:a16="http://schemas.microsoft.com/office/drawing/2014/main" id="{08D3A908-E384-4210-8BC8-333DEE839563}"/>
+                <a16:creationId xmlns:a16="http://schemas.microsoft.com/office/drawing/2014/main" id="{3A7AAFE6-97BE-4180-9C1D-3D13E6FFF151}"/>
               </a:ext>
             </a:extLst>
           </p:cNvPr>
@@ -4115,14 +5788,28 @@
           <a:bodyPr/>
           <a:lstStyle/>
           <a:p>
-            <a:endParaRPr lang="en-US"/>
+            <a:endParaRPr lang="en-US" b="1" dirty="0"/>
+          </a:p>
+          <a:p>
+            <a:r>
+              <a:rPr lang="en-US" sz="3600" b="1" dirty="0"/>
+              <a:t>Domain of interest: </a:t>
+            </a:r>
+            <a:r>
+              <a:rPr lang="en-US" sz="3600" u="sng" dirty="0"/>
+              <a:t>Software Engineering</a:t>
+            </a:r>
+            <a:r>
+              <a:rPr lang="en-US" sz="3600" dirty="0"/>
+              <a:t>.</a:t>
+            </a:r>
           </a:p>
         </p:txBody>
       </p:sp>
     </p:spTree>
     <p:extLst>
       <p:ext uri="{BB962C8B-B14F-4D97-AF65-F5344CB8AC3E}">
-        <p14:creationId xmlns:p14="http://schemas.microsoft.com/office/powerpoint/2010/main" val="4159975440"/>
+        <p14:creationId xmlns:p14="http://schemas.microsoft.com/office/powerpoint/2010/main" val="335889816"/>
       </p:ext>
     </p:extLst>
   </p:cSld>
@@ -4154,7 +5841,7 @@
           <p:cNvPr id="2" name="Title 1">
             <a:extLst>
               <a:ext uri="{FF2B5EF4-FFF2-40B4-BE49-F238E27FC236}">
-                <a16:creationId xmlns:a16="http://schemas.microsoft.com/office/drawing/2014/main" id="{F4E2798D-85ED-4856-A98E-292B32F233B4}"/>
+                <a16:creationId xmlns:a16="http://schemas.microsoft.com/office/drawing/2014/main" id="{8CC3C86C-8969-4A41-9D76-5E68C9650353}"/>
               </a:ext>
             </a:extLst>
           </p:cNvPr>
@@ -4172,7 +5859,7 @@
           <a:p>
             <a:r>
               <a:rPr lang="en-US" dirty="0"/>
-              <a:t>System Analysis and Design</a:t>
+              <a:t>Problem significance</a:t>
             </a:r>
           </a:p>
         </p:txBody>
@@ -4182,7 +5869,7 @@
           <p:cNvPr id="3" name="Content Placeholder 2">
             <a:extLst>
               <a:ext uri="{FF2B5EF4-FFF2-40B4-BE49-F238E27FC236}">
-                <a16:creationId xmlns:a16="http://schemas.microsoft.com/office/drawing/2014/main" id="{0381613B-F365-468F-96FF-72DDDAF904EF}"/>
+                <a16:creationId xmlns:a16="http://schemas.microsoft.com/office/drawing/2014/main" id="{08D3A908-E384-4210-8BC8-333DEE839563}"/>
               </a:ext>
             </a:extLst>
           </p:cNvPr>
@@ -4195,17 +5882,77 @@
         </p:nvSpPr>
         <p:spPr/>
         <p:txBody>
-          <a:bodyPr/>
-          <a:lstStyle/>
-          <a:p>
-            <a:endParaRPr lang="en-US"/>
+          <a:bodyPr>
+            <a:normAutofit fontScale="92500"/>
+          </a:bodyPr>
+          <a:lstStyle/>
+          <a:p>
+            <a:pPr marL="0" indent="0">
+              <a:buNone/>
+            </a:pPr>
+            <a:r>
+              <a:rPr lang="en-US" sz="4300" dirty="0"/>
+              <a:t>What is the Problem we are going to solve?</a:t>
+            </a:r>
+          </a:p>
+          <a:p>
+            <a:endParaRPr lang="en-US" dirty="0"/>
+          </a:p>
+          <a:p>
+            <a:r>
+              <a:rPr lang="en-US" dirty="0"/>
+              <a:t>Students are dispersed between many places: E-</a:t>
+            </a:r>
+            <a:r>
+              <a:rPr lang="en-US" dirty="0" err="1"/>
+              <a:t>comm</a:t>
+            </a:r>
+            <a:r>
+              <a:rPr lang="en-US" dirty="0"/>
+              <a:t>, Facebook, Acadox, </a:t>
+            </a:r>
+            <a:r>
+              <a:rPr lang="en-US" dirty="0" err="1"/>
+              <a:t>Gdrive</a:t>
+            </a:r>
+            <a:r>
+              <a:rPr lang="en-US" dirty="0"/>
+              <a:t>, …</a:t>
+            </a:r>
+          </a:p>
+          <a:p>
+            <a:endParaRPr lang="en-US" dirty="0"/>
+          </a:p>
+          <a:p>
+            <a:r>
+              <a:rPr lang="en-US" dirty="0"/>
+              <a:t>Students lose grades, by losing track of assignments, quizzes &amp; materials.</a:t>
+            </a:r>
+          </a:p>
+          <a:p>
+            <a:endParaRPr lang="en-US" dirty="0"/>
+          </a:p>
+          <a:p>
+            <a:r>
+              <a:rPr lang="en-US" dirty="0"/>
+              <a:t>No easy way of communication between students &amp; Teachers (professors &amp; TAs)</a:t>
+            </a:r>
+          </a:p>
+          <a:p>
+            <a:endParaRPr lang="en-US" dirty="0"/>
+          </a:p>
+          <a:p>
+            <a:endParaRPr lang="en-US" dirty="0"/>
+          </a:p>
+          <a:p>
+            <a:endParaRPr lang="en-US" dirty="0"/>
           </a:p>
         </p:txBody>
       </p:sp>
     </p:spTree>
     <p:extLst>
       <p:ext uri="{BB962C8B-B14F-4D97-AF65-F5344CB8AC3E}">
-        <p14:creationId xmlns:p14="http://schemas.microsoft.com/office/powerpoint/2010/main" val="3248517035"/>
+        <p14:creationId xmlns:p14="http://schemas.microsoft.com/office/powerpoint/2010/main" val="4159975440"/>
       </p:ext>
     </p:extLst>
   </p:cSld>
@@ -4237,7 +5984,7 @@
           <p:cNvPr id="2" name="Title 1">
             <a:extLst>
               <a:ext uri="{FF2B5EF4-FFF2-40B4-BE49-F238E27FC236}">
-                <a16:creationId xmlns:a16="http://schemas.microsoft.com/office/drawing/2014/main" id="{37C2E81E-8C30-4420-81C2-9F95C4C74AD5}"/>
+                <a16:creationId xmlns:a16="http://schemas.microsoft.com/office/drawing/2014/main" id="{023408CB-4CB9-4EEB-A05A-8DD52A5DCC3C}"/>
               </a:ext>
             </a:extLst>
           </p:cNvPr>
@@ -4250,12 +5997,15 @@
         </p:nvSpPr>
         <p:spPr/>
         <p:txBody>
-          <a:bodyPr/>
-          <a:lstStyle/>
-          <a:p>
-            <a:r>
-              <a:rPr lang="en-US" dirty="0"/>
-              <a:t>Draft of screenshots of expected system screens</a:t>
+          <a:bodyPr>
+            <a:normAutofit/>
+          </a:bodyPr>
+          <a:lstStyle/>
+          <a:p>
+            <a:pPr algn="ctr"/>
+            <a:r>
+              <a:rPr lang="en-US" sz="8800" dirty="0"/>
+              <a:t>FCI E-campus</a:t>
             </a:r>
           </a:p>
         </p:txBody>
@@ -4265,7 +6015,7 @@
           <p:cNvPr id="3" name="Content Placeholder 2">
             <a:extLst>
               <a:ext uri="{FF2B5EF4-FFF2-40B4-BE49-F238E27FC236}">
-                <a16:creationId xmlns:a16="http://schemas.microsoft.com/office/drawing/2014/main" id="{9EBA160E-CD0F-482F-A84F-B21823BFC8B4}"/>
+                <a16:creationId xmlns:a16="http://schemas.microsoft.com/office/drawing/2014/main" id="{222FE1E4-A5F2-44D0-ADAD-6B872F070D4D}"/>
               </a:ext>
             </a:extLst>
           </p:cNvPr>
@@ -4281,14 +6031,63 @@
           <a:bodyPr/>
           <a:lstStyle/>
           <a:p>
-            <a:endParaRPr lang="en-US"/>
+            <a:pPr marL="0" indent="0" algn="ctr">
+              <a:buNone/>
+            </a:pPr>
+            <a:endParaRPr lang="en-US" sz="4800" b="1" dirty="0">
+              <a:solidFill>
+                <a:srgbClr val="FF0000"/>
+              </a:solidFill>
+            </a:endParaRPr>
+          </a:p>
+          <a:p>
+            <a:pPr marL="0" indent="0" algn="ctr">
+              <a:buNone/>
+            </a:pPr>
+            <a:r>
+              <a:rPr lang="en-US" sz="4800" b="1" dirty="0">
+                <a:solidFill>
+                  <a:srgbClr val="FF0000"/>
+                </a:solidFill>
+              </a:rPr>
+              <a:t>No more Facebook</a:t>
+            </a:r>
+          </a:p>
+          <a:p>
+            <a:pPr marL="0" indent="0" algn="ctr">
+              <a:buNone/>
+            </a:pPr>
+            <a:r>
+              <a:rPr lang="en-US" sz="4800" b="1" dirty="0">
+                <a:solidFill>
+                  <a:srgbClr val="FF0000"/>
+                </a:solidFill>
+              </a:rPr>
+              <a:t>No more Acadox</a:t>
+            </a:r>
+          </a:p>
+          <a:p>
+            <a:pPr marL="0" indent="0" algn="ctr">
+              <a:buNone/>
+            </a:pPr>
+            <a:r>
+              <a:rPr lang="en-US" sz="4800" b="1" dirty="0">
+                <a:solidFill>
+                  <a:srgbClr val="FF0000"/>
+                </a:solidFill>
+              </a:rPr>
+              <a:t>No more mess</a:t>
+            </a:r>
+          </a:p>
+          <a:p>
+            <a:endParaRPr lang="en-US" dirty="0"/>
           </a:p>
         </p:txBody>
       </p:sp>
     </p:spTree>
     <p:extLst>
       <p:ext uri="{BB962C8B-B14F-4D97-AF65-F5344CB8AC3E}">
-        <p14:creationId xmlns:p14="http://schemas.microsoft.com/office/powerpoint/2010/main" val="3149044935"/>
+        <p14:creationId xmlns:p14="http://schemas.microsoft.com/office/powerpoint/2010/main" val="1998764432"/>
       </p:ext>
     </p:extLst>
   </p:cSld>
@@ -4320,7 +6119,7 @@
           <p:cNvPr id="2" name="Title 1">
             <a:extLst>
               <a:ext uri="{FF2B5EF4-FFF2-40B4-BE49-F238E27FC236}">
-                <a16:creationId xmlns:a16="http://schemas.microsoft.com/office/drawing/2014/main" id="{0FB259C1-57F3-45E4-AC63-2DB1D7422228}"/>
+                <a16:creationId xmlns:a16="http://schemas.microsoft.com/office/drawing/2014/main" id="{F4E2798D-85ED-4856-A98E-292B32F233B4}"/>
               </a:ext>
             </a:extLst>
           </p:cNvPr>
@@ -4338,7 +6137,14 @@
           <a:p>
             <a:r>
               <a:rPr lang="en-US" dirty="0"/>
-              <a:t>Time Plan</a:t>
+              <a:t>System Analysis and Design: </a:t>
+            </a:r>
+            <a:br>
+              <a:rPr lang="en-US" dirty="0"/>
+            </a:br>
+            <a:r>
+              <a:rPr lang="en-US" b="1" i="1" dirty="0"/>
+              <a:t>System architecture</a:t>
             </a:r>
           </a:p>
         </p:txBody>
@@ -4348,7 +6154,7 @@
           <p:cNvPr id="3" name="Content Placeholder 2">
             <a:extLst>
               <a:ext uri="{FF2B5EF4-FFF2-40B4-BE49-F238E27FC236}">
-                <a16:creationId xmlns:a16="http://schemas.microsoft.com/office/drawing/2014/main" id="{0703150A-F7E2-4A79-8DE3-22649BE46A1D}"/>
+                <a16:creationId xmlns:a16="http://schemas.microsoft.com/office/drawing/2014/main" id="{0381613B-F365-468F-96FF-72DDDAF904EF}"/>
               </a:ext>
             </a:extLst>
           </p:cNvPr>
@@ -4364,14 +6170,29 @@
           <a:bodyPr/>
           <a:lstStyle/>
           <a:p>
-            <a:endParaRPr lang="en-US"/>
+            <a:endParaRPr lang="en-US" dirty="0"/>
+          </a:p>
+          <a:p>
+            <a:r>
+              <a:rPr lang="en-US" dirty="0"/>
+              <a:t>Our system uses Service-Oriented Architecture (SOA).</a:t>
+            </a:r>
+          </a:p>
+          <a:p>
+            <a:endParaRPr lang="en-US" dirty="0"/>
+          </a:p>
+          <a:p>
+            <a:r>
+              <a:rPr lang="en-US" dirty="0"/>
+              <a:t>RESTful Web Services provided by the backend for the front-end clients</a:t>
+            </a:r>
           </a:p>
         </p:txBody>
       </p:sp>
     </p:spTree>
     <p:extLst>
       <p:ext uri="{BB962C8B-B14F-4D97-AF65-F5344CB8AC3E}">
-        <p14:creationId xmlns:p14="http://schemas.microsoft.com/office/powerpoint/2010/main" val="609484539"/>
+        <p14:creationId xmlns:p14="http://schemas.microsoft.com/office/powerpoint/2010/main" val="3248517035"/>
       </p:ext>
     </p:extLst>
   </p:cSld>
@@ -4403,7 +6224,7 @@
           <p:cNvPr id="2" name="Title 1">
             <a:extLst>
               <a:ext uri="{FF2B5EF4-FFF2-40B4-BE49-F238E27FC236}">
-                <a16:creationId xmlns:a16="http://schemas.microsoft.com/office/drawing/2014/main" id="{A672E45D-E657-4BB8-87D1-0EDABB4693E9}"/>
+                <a16:creationId xmlns:a16="http://schemas.microsoft.com/office/drawing/2014/main" id="{1EE07663-57C2-4E53-82EC-1DD5ADF22976}"/>
               </a:ext>
             </a:extLst>
           </p:cNvPr>
@@ -4416,12 +6237,21 @@
         </p:nvSpPr>
         <p:spPr/>
         <p:txBody>
-          <a:bodyPr/>
+          <a:bodyPr>
+            <a:normAutofit/>
+          </a:bodyPr>
           <a:lstStyle/>
           <a:p>
             <a:r>
               <a:rPr lang="en-US" dirty="0"/>
-              <a:t>Conclusion</a:t>
+              <a:t>System Analysis and Design:</a:t>
+            </a:r>
+            <a:br>
+              <a:rPr lang="en-US" dirty="0"/>
+            </a:br>
+            <a:r>
+              <a:rPr lang="en-US" b="1" i="1" dirty="0"/>
+              <a:t>Stakeholders</a:t>
             </a:r>
           </a:p>
         </p:txBody>
@@ -4431,7 +6261,7 @@
           <p:cNvPr id="3" name="Content Placeholder 2">
             <a:extLst>
               <a:ext uri="{FF2B5EF4-FFF2-40B4-BE49-F238E27FC236}">
-                <a16:creationId xmlns:a16="http://schemas.microsoft.com/office/drawing/2014/main" id="{A9A8A72B-7CA0-4BDC-8C1B-5F6308907B91}"/>
+                <a16:creationId xmlns:a16="http://schemas.microsoft.com/office/drawing/2014/main" id="{4953765D-4BA6-4CA8-9A44-AF4B21CFD8BB}"/>
               </a:ext>
             </a:extLst>
           </p:cNvPr>
@@ -4447,14 +6277,342 @@
           <a:bodyPr/>
           <a:lstStyle/>
           <a:p>
-            <a:endParaRPr lang="en-US"/>
+            <a:endParaRPr lang="en-US" dirty="0"/>
+          </a:p>
+          <a:p>
+            <a:r>
+              <a:rPr lang="en-US" dirty="0"/>
+              <a:t>Students at FCI</a:t>
+            </a:r>
+          </a:p>
+          <a:p>
+            <a:endParaRPr lang="en-US" dirty="0"/>
+          </a:p>
+          <a:p>
+            <a:r>
+              <a:rPr lang="en-US" dirty="0"/>
+              <a:t>FCI professors, TAs, Administration.</a:t>
+            </a:r>
+          </a:p>
+          <a:p>
+            <a:endParaRPr lang="en-US" dirty="0"/>
           </a:p>
         </p:txBody>
       </p:sp>
     </p:spTree>
     <p:extLst>
       <p:ext uri="{BB962C8B-B14F-4D97-AF65-F5344CB8AC3E}">
-        <p14:creationId xmlns:p14="http://schemas.microsoft.com/office/powerpoint/2010/main" val="519845742"/>
+        <p14:creationId xmlns:p14="http://schemas.microsoft.com/office/powerpoint/2010/main" val="363611915"/>
+      </p:ext>
+    </p:extLst>
+  </p:cSld>
+  <p:clrMapOvr>
+    <a:masterClrMapping/>
+  </p:clrMapOvr>
+</p:sld>
+</file>
+
+<file path=ppt/slides/slide8.xml><?xml version="1.0" encoding="utf-8"?>
+<p:sld xmlns:a="http://schemas.openxmlformats.org/drawingml/2006/main" xmlns:r="http://schemas.openxmlformats.org/officeDocument/2006/relationships" xmlns:p="http://schemas.openxmlformats.org/presentationml/2006/main">
+  <p:cSld>
+    <p:spTree>
+      <p:nvGrpSpPr>
+        <p:cNvPr id="1" name=""/>
+        <p:cNvGrpSpPr/>
+        <p:nvPr/>
+      </p:nvGrpSpPr>
+      <p:grpSpPr>
+        <a:xfrm>
+          <a:off x="0" y="0"/>
+          <a:ext cx="0" cy="0"/>
+          <a:chOff x="0" y="0"/>
+          <a:chExt cx="0" cy="0"/>
+        </a:xfrm>
+      </p:grpSpPr>
+      <p:sp>
+        <p:nvSpPr>
+          <p:cNvPr id="2" name="Title 1">
+            <a:extLst>
+              <a:ext uri="{FF2B5EF4-FFF2-40B4-BE49-F238E27FC236}">
+                <a16:creationId xmlns:a16="http://schemas.microsoft.com/office/drawing/2014/main" id="{BEC304BF-742F-4F83-A497-94122D16A5A3}"/>
+              </a:ext>
+            </a:extLst>
+          </p:cNvPr>
+          <p:cNvSpPr>
+            <a:spLocks noGrp="1"/>
+          </p:cNvSpPr>
+          <p:nvPr>
+            <p:ph type="title"/>
+          </p:nvPr>
+        </p:nvSpPr>
+        <p:spPr/>
+        <p:txBody>
+          <a:bodyPr>
+            <a:normAutofit/>
+          </a:bodyPr>
+          <a:lstStyle/>
+          <a:p>
+            <a:r>
+              <a:rPr lang="en-US" dirty="0"/>
+              <a:t>System Analysis and Design:</a:t>
+            </a:r>
+            <a:br>
+              <a:rPr lang="en-US" dirty="0"/>
+            </a:br>
+            <a:r>
+              <a:rPr lang="en-US" b="1" i="1" dirty="0"/>
+              <a:t>Functional Requirements</a:t>
+            </a:r>
+          </a:p>
+        </p:txBody>
+      </p:sp>
+      <p:sp>
+        <p:nvSpPr>
+          <p:cNvPr id="3" name="Content Placeholder 2">
+            <a:extLst>
+              <a:ext uri="{FF2B5EF4-FFF2-40B4-BE49-F238E27FC236}">
+                <a16:creationId xmlns:a16="http://schemas.microsoft.com/office/drawing/2014/main" id="{9560E026-B5BF-4D18-BBDA-931CDA3EA5EF}"/>
+              </a:ext>
+            </a:extLst>
+          </p:cNvPr>
+          <p:cNvSpPr>
+            <a:spLocks noGrp="1"/>
+          </p:cNvSpPr>
+          <p:nvPr>
+            <p:ph idx="1"/>
+          </p:nvPr>
+        </p:nvSpPr>
+        <p:spPr/>
+        <p:txBody>
+          <a:bodyPr>
+            <a:normAutofit lnSpcReduction="10000"/>
+          </a:bodyPr>
+          <a:lstStyle/>
+          <a:p>
+            <a:r>
+              <a:rPr lang="en-US" dirty="0"/>
+              <a:t>The app will allow each student, professor and TA to </a:t>
+            </a:r>
+            <a:r>
+              <a:rPr lang="en-US" u="sng" dirty="0"/>
+              <a:t>own an account</a:t>
+            </a:r>
+            <a:r>
+              <a:rPr lang="en-US" dirty="0"/>
+              <a:t> but everyone has special permissions and capabilities in the system. Students don’t need to be </a:t>
+            </a:r>
+            <a:r>
+              <a:rPr lang="en-US" b="1" dirty="0"/>
+              <a:t>verified</a:t>
+            </a:r>
+            <a:r>
+              <a:rPr lang="en-US" dirty="0"/>
+              <a:t> but teachers do.</a:t>
+            </a:r>
+          </a:p>
+          <a:p>
+            <a:r>
+              <a:rPr lang="en-US" dirty="0"/>
+              <a:t>A </a:t>
+            </a:r>
+            <a:r>
+              <a:rPr lang="en-US" u="sng" dirty="0"/>
+              <a:t>Schedule</a:t>
+            </a:r>
+            <a:r>
+              <a:rPr lang="en-US" dirty="0"/>
+              <a:t> with courses lectures, labs and sections each student has according to his registered courses. This schedule shows the user what he/she has at every slot of the day (like lecture, lab, section or delivering assignments and tasks or exams). </a:t>
+            </a:r>
+          </a:p>
+          <a:p>
+            <a:r>
+              <a:rPr lang="en-US" dirty="0"/>
+              <a:t>A </a:t>
+            </a:r>
+            <a:r>
+              <a:rPr lang="en-US" u="sng" dirty="0"/>
+              <a:t>static map</a:t>
+            </a:r>
+            <a:r>
+              <a:rPr lang="en-US" dirty="0"/>
+              <a:t> for the faculty which guides the students by showing the buildings and the location of each lecture/section hall as well as professors’ offices, TAs’ office, the library, the mosque, the restaurant, </a:t>
+            </a:r>
+            <a:r>
+              <a:rPr lang="en-US" dirty="0" err="1"/>
+              <a:t>etc</a:t>
+            </a:r>
+            <a:r>
+              <a:rPr lang="en-US" dirty="0"/>
+              <a:t>…</a:t>
+            </a:r>
+          </a:p>
+          <a:p>
+            <a:endParaRPr lang="en-US" dirty="0"/>
+          </a:p>
+          <a:p>
+            <a:endParaRPr lang="en-US" dirty="0"/>
+          </a:p>
+          <a:p>
+            <a:endParaRPr lang="en-US" dirty="0"/>
+          </a:p>
+          <a:p>
+            <a:endParaRPr lang="en-US" dirty="0"/>
+          </a:p>
+        </p:txBody>
+      </p:sp>
+    </p:spTree>
+    <p:extLst>
+      <p:ext uri="{BB962C8B-B14F-4D97-AF65-F5344CB8AC3E}">
+        <p14:creationId xmlns:p14="http://schemas.microsoft.com/office/powerpoint/2010/main" val="4054516798"/>
+      </p:ext>
+    </p:extLst>
+  </p:cSld>
+  <p:clrMapOvr>
+    <a:masterClrMapping/>
+  </p:clrMapOvr>
+</p:sld>
+</file>
+
+<file path=ppt/slides/slide9.xml><?xml version="1.0" encoding="utf-8"?>
+<p:sld xmlns:a="http://schemas.openxmlformats.org/drawingml/2006/main" xmlns:r="http://schemas.openxmlformats.org/officeDocument/2006/relationships" xmlns:p="http://schemas.openxmlformats.org/presentationml/2006/main">
+  <p:cSld>
+    <p:spTree>
+      <p:nvGrpSpPr>
+        <p:cNvPr id="1" name=""/>
+        <p:cNvGrpSpPr/>
+        <p:nvPr/>
+      </p:nvGrpSpPr>
+      <p:grpSpPr>
+        <a:xfrm>
+          <a:off x="0" y="0"/>
+          <a:ext cx="0" cy="0"/>
+          <a:chOff x="0" y="0"/>
+          <a:chExt cx="0" cy="0"/>
+        </a:xfrm>
+      </p:grpSpPr>
+      <p:sp>
+        <p:nvSpPr>
+          <p:cNvPr id="2" name="Title 1">
+            <a:extLst>
+              <a:ext uri="{FF2B5EF4-FFF2-40B4-BE49-F238E27FC236}">
+                <a16:creationId xmlns:a16="http://schemas.microsoft.com/office/drawing/2014/main" id="{A1AD989A-682A-4258-A05A-E6CCF2966EEB}"/>
+              </a:ext>
+            </a:extLst>
+          </p:cNvPr>
+          <p:cNvSpPr>
+            <a:spLocks noGrp="1"/>
+          </p:cNvSpPr>
+          <p:nvPr>
+            <p:ph type="title"/>
+          </p:nvPr>
+        </p:nvSpPr>
+        <p:spPr/>
+        <p:txBody>
+          <a:bodyPr/>
+          <a:lstStyle/>
+          <a:p>
+            <a:r>
+              <a:rPr lang="en-US" dirty="0"/>
+              <a:t>System Analysis and Design:</a:t>
+            </a:r>
+            <a:br>
+              <a:rPr lang="en-US" dirty="0"/>
+            </a:br>
+            <a:r>
+              <a:rPr lang="en-US" b="1" i="1" dirty="0"/>
+              <a:t>Functional Requirements</a:t>
+            </a:r>
+            <a:endParaRPr lang="en-US" dirty="0"/>
+          </a:p>
+        </p:txBody>
+      </p:sp>
+      <p:sp>
+        <p:nvSpPr>
+          <p:cNvPr id="3" name="Content Placeholder 2">
+            <a:extLst>
+              <a:ext uri="{FF2B5EF4-FFF2-40B4-BE49-F238E27FC236}">
+                <a16:creationId xmlns:a16="http://schemas.microsoft.com/office/drawing/2014/main" id="{A718FC98-2FF3-4E95-A3F5-7F360867D58F}"/>
+              </a:ext>
+            </a:extLst>
+          </p:cNvPr>
+          <p:cNvSpPr>
+            <a:spLocks noGrp="1"/>
+          </p:cNvSpPr>
+          <p:nvPr>
+            <p:ph idx="1"/>
+          </p:nvPr>
+        </p:nvSpPr>
+        <p:spPr/>
+        <p:txBody>
+          <a:bodyPr>
+            <a:normAutofit lnSpcReduction="10000"/>
+          </a:bodyPr>
+          <a:lstStyle/>
+          <a:p>
+            <a:r>
+              <a:rPr lang="en-US" dirty="0"/>
+              <a:t>For each course the student is registered in there will be a resources screen which includes the </a:t>
+            </a:r>
+            <a:r>
+              <a:rPr lang="en-US" u="sng" dirty="0"/>
+              <a:t>materials</a:t>
+            </a:r>
+            <a:r>
+              <a:rPr lang="en-US" dirty="0"/>
+              <a:t> for this course. </a:t>
+            </a:r>
+          </a:p>
+          <a:p>
+            <a:r>
+              <a:rPr lang="en-US" dirty="0"/>
+              <a:t>Teachers &amp; the moderator students can upload materials to other students in their courses.</a:t>
+            </a:r>
+          </a:p>
+          <a:p>
+            <a:r>
+              <a:rPr lang="en-US" dirty="0"/>
+              <a:t>Allow Professors &amp; TAs to add </a:t>
+            </a:r>
+            <a:r>
+              <a:rPr lang="en-US" u="sng" dirty="0"/>
+              <a:t>tasks</a:t>
+            </a:r>
+            <a:r>
+              <a:rPr lang="en-US" dirty="0"/>
+              <a:t> to the courses they are assigned to. These tasks can be assignments, lab tasks, quizzes, etc... Each task will have a </a:t>
+            </a:r>
+            <a:r>
+              <a:rPr lang="en-US" u="sng" dirty="0"/>
+              <a:t>due date</a:t>
+            </a:r>
+            <a:r>
+              <a:rPr lang="en-US" dirty="0"/>
+              <a:t>. These tasks appear on students’ schedules &amp; students will receive a notification when a new task is added.</a:t>
+            </a:r>
+          </a:p>
+          <a:p>
+            <a:r>
+              <a:rPr lang="en-US" dirty="0"/>
+              <a:t>The app will have an </a:t>
+            </a:r>
+            <a:r>
+              <a:rPr lang="en-US" u="sng" dirty="0"/>
+              <a:t>Announcements</a:t>
+            </a:r>
+            <a:r>
+              <a:rPr lang="en-US" dirty="0"/>
+              <a:t> Screen to inform students with any new announcements made by the Admin. Relating to the faculty in general, not to a specific course.</a:t>
+            </a:r>
+          </a:p>
+          <a:p>
+            <a:endParaRPr lang="en-US" dirty="0"/>
+          </a:p>
+        </p:txBody>
+      </p:sp>
+    </p:spTree>
+    <p:extLst>
+      <p:ext uri="{BB962C8B-B14F-4D97-AF65-F5344CB8AC3E}">
+        <p14:creationId xmlns:p14="http://schemas.microsoft.com/office/powerpoint/2010/main" val="2062805275"/>
       </p:ext>
     </p:extLst>
   </p:cSld>
@@ -4757,4 +6915,299 @@
     </a:ext>
   </a:extLst>
 </a:theme>
+</file>
+
+<file path=ppt/theme/theme2.xml><?xml version="1.0" encoding="utf-8"?>
+<a:theme xmlns:a="http://schemas.openxmlformats.org/drawingml/2006/main" name="Office Theme">
+  <a:themeElements>
+    <a:clrScheme name="Office">
+      <a:dk1>
+        <a:sysClr val="windowText" lastClr="000000"/>
+      </a:dk1>
+      <a:lt1>
+        <a:sysClr val="window" lastClr="FFFFFF"/>
+      </a:lt1>
+      <a:dk2>
+        <a:srgbClr val="44546A"/>
+      </a:dk2>
+      <a:lt2>
+        <a:srgbClr val="E7E6E6"/>
+      </a:lt2>
+      <a:accent1>
+        <a:srgbClr val="4472C4"/>
+      </a:accent1>
+      <a:accent2>
+        <a:srgbClr val="ED7D31"/>
+      </a:accent2>
+      <a:accent3>
+        <a:srgbClr val="A5A5A5"/>
+      </a:accent3>
+      <a:accent4>
+        <a:srgbClr val="FFC000"/>
+      </a:accent4>
+      <a:accent5>
+        <a:srgbClr val="5B9BD5"/>
+      </a:accent5>
+      <a:accent6>
+        <a:srgbClr val="70AD47"/>
+      </a:accent6>
+      <a:hlink>
+        <a:srgbClr val="0563C1"/>
+      </a:hlink>
+      <a:folHlink>
+        <a:srgbClr val="954F72"/>
+      </a:folHlink>
+    </a:clrScheme>
+    <a:fontScheme name="Office">
+      <a:majorFont>
+        <a:latin typeface="Calibri Light" panose="020F0302020204030204"/>
+        <a:ea typeface=""/>
+        <a:cs typeface=""/>
+        <a:font script="Jpan" typeface="游ゴシック Light"/>
+        <a:font script="Hang" typeface="맑은 고딕"/>
+        <a:font script="Hans" typeface="等线 Light"/>
+        <a:font script="Hant" typeface="新細明體"/>
+        <a:font script="Arab" typeface="Times New Roman"/>
+        <a:font script="Hebr" typeface="Times New Roman"/>
+        <a:font script="Thai" typeface="Angsana New"/>
+        <a:font script="Ethi" typeface="Nyala"/>
+        <a:font script="Beng" typeface="Vrinda"/>
+        <a:font script="Gujr" typeface="Shruti"/>
+        <a:font script="Khmr" typeface="MoolBoran"/>
+        <a:font script="Knda" typeface="Tunga"/>
+        <a:font script="Guru" typeface="Raavi"/>
+        <a:font script="Cans" typeface="Euphemia"/>
+        <a:font script="Cher" typeface="Plantagenet Cherokee"/>
+        <a:font script="Yiii" typeface="Microsoft Yi Baiti"/>
+        <a:font script="Tibt" typeface="Microsoft Himalaya"/>
+        <a:font script="Thaa" typeface="MV Boli"/>
+        <a:font script="Deva" typeface="Mangal"/>
+        <a:font script="Telu" typeface="Gautami"/>
+        <a:font script="Taml" typeface="Latha"/>
+        <a:font script="Syrc" typeface="Estrangelo Edessa"/>
+        <a:font script="Orya" typeface="Kalinga"/>
+        <a:font script="Mlym" typeface="Kartika"/>
+        <a:font script="Laoo" typeface="DokChampa"/>
+        <a:font script="Sinh" typeface="Iskoola Pota"/>
+        <a:font script="Mong" typeface="Mongolian Baiti"/>
+        <a:font script="Viet" typeface="Times New Roman"/>
+        <a:font script="Uigh" typeface="Microsoft Uighur"/>
+        <a:font script="Geor" typeface="Sylfaen"/>
+        <a:font script="Armn" typeface="Arial"/>
+        <a:font script="Bugi" typeface="Leelawadee UI"/>
+        <a:font script="Bopo" typeface="Microsoft JhengHei"/>
+        <a:font script="Java" typeface="Javanese Text"/>
+        <a:font script="Lisu" typeface="Segoe UI"/>
+        <a:font script="Mymr" typeface="Myanmar Text"/>
+        <a:font script="Nkoo" typeface="Ebrima"/>
+        <a:font script="Olck" typeface="Nirmala UI"/>
+        <a:font script="Osma" typeface="Ebrima"/>
+        <a:font script="Phag" typeface="Phagspa"/>
+        <a:font script="Syrn" typeface="Estrangelo Edessa"/>
+        <a:font script="Syrj" typeface="Estrangelo Edessa"/>
+        <a:font script="Syre" typeface="Estrangelo Edessa"/>
+        <a:font script="Sora" typeface="Nirmala UI"/>
+        <a:font script="Tale" typeface="Microsoft Tai Le"/>
+        <a:font script="Talu" typeface="Microsoft New Tai Lue"/>
+        <a:font script="Tfng" typeface="Ebrima"/>
+      </a:majorFont>
+      <a:minorFont>
+        <a:latin typeface="Calibri" panose="020F0502020204030204"/>
+        <a:ea typeface=""/>
+        <a:cs typeface=""/>
+        <a:font script="Jpan" typeface="游ゴシック"/>
+        <a:font script="Hang" typeface="맑은 고딕"/>
+        <a:font script="Hans" typeface="等线"/>
+        <a:font script="Hant" typeface="新細明體"/>
+        <a:font script="Arab" typeface="Arial"/>
+        <a:font script="Hebr" typeface="Arial"/>
+        <a:font script="Thai" typeface="Cordia New"/>
+        <a:font script="Ethi" typeface="Nyala"/>
+        <a:font script="Beng" typeface="Vrinda"/>
+        <a:font script="Gujr" typeface="Shruti"/>
+        <a:font script="Khmr" typeface="DaunPenh"/>
+        <a:font script="Knda" typeface="Tunga"/>
+        <a:font script="Guru" typeface="Raavi"/>
+        <a:font script="Cans" typeface="Euphemia"/>
+        <a:font script="Cher" typeface="Plantagenet Cherokee"/>
+        <a:font script="Yiii" typeface="Microsoft Yi Baiti"/>
+        <a:font script="Tibt" typeface="Microsoft Himalaya"/>
+        <a:font script="Thaa" typeface="MV Boli"/>
+        <a:font script="Deva" typeface="Mangal"/>
+        <a:font script="Telu" typeface="Gautami"/>
+        <a:font script="Taml" typeface="Latha"/>
+        <a:font script="Syrc" typeface="Estrangelo Edessa"/>
+        <a:font script="Orya" typeface="Kalinga"/>
+        <a:font script="Mlym" typeface="Kartika"/>
+        <a:font script="Laoo" typeface="DokChampa"/>
+        <a:font script="Sinh" typeface="Iskoola Pota"/>
+        <a:font script="Mong" typeface="Mongolian Baiti"/>
+        <a:font script="Viet" typeface="Arial"/>
+        <a:font script="Uigh" typeface="Microsoft Uighur"/>
+        <a:font script="Geor" typeface="Sylfaen"/>
+        <a:font script="Armn" typeface="Arial"/>
+        <a:font script="Bugi" typeface="Leelawadee UI"/>
+        <a:font script="Bopo" typeface="Microsoft JhengHei"/>
+        <a:font script="Java" typeface="Javanese Text"/>
+        <a:font script="Lisu" typeface="Segoe UI"/>
+        <a:font script="Mymr" typeface="Myanmar Text"/>
+        <a:font script="Nkoo" typeface="Ebrima"/>
+        <a:font script="Olck" typeface="Nirmala UI"/>
+        <a:font script="Osma" typeface="Ebrima"/>
+        <a:font script="Phag" typeface="Phagspa"/>
+        <a:font script="Syrn" typeface="Estrangelo Edessa"/>
+        <a:font script="Syrj" typeface="Estrangelo Edessa"/>
+        <a:font script="Syre" typeface="Estrangelo Edessa"/>
+        <a:font script="Sora" typeface="Nirmala UI"/>
+        <a:font script="Tale" typeface="Microsoft Tai Le"/>
+        <a:font script="Talu" typeface="Microsoft New Tai Lue"/>
+        <a:font script="Tfng" typeface="Ebrima"/>
+      </a:minorFont>
+    </a:fontScheme>
+    <a:fmtScheme name="Office">
+      <a:fillStyleLst>
+        <a:solidFill>
+          <a:schemeClr val="phClr"/>
+        </a:solidFill>
+        <a:gradFill rotWithShape="1">
+          <a:gsLst>
+            <a:gs pos="0">
+              <a:schemeClr val="phClr">
+                <a:lumMod val="110000"/>
+                <a:satMod val="105000"/>
+                <a:tint val="67000"/>
+              </a:schemeClr>
+            </a:gs>
+            <a:gs pos="50000">
+              <a:schemeClr val="phClr">
+                <a:lumMod val="105000"/>
+                <a:satMod val="103000"/>
+                <a:tint val="73000"/>
+              </a:schemeClr>
+            </a:gs>
+            <a:gs pos="100000">
+              <a:schemeClr val="phClr">
+                <a:lumMod val="105000"/>
+                <a:satMod val="109000"/>
+                <a:tint val="81000"/>
+              </a:schemeClr>
+            </a:gs>
+          </a:gsLst>
+          <a:lin ang="5400000" scaled="0"/>
+        </a:gradFill>
+        <a:gradFill rotWithShape="1">
+          <a:gsLst>
+            <a:gs pos="0">
+              <a:schemeClr val="phClr">
+                <a:satMod val="103000"/>
+                <a:lumMod val="102000"/>
+                <a:tint val="94000"/>
+              </a:schemeClr>
+            </a:gs>
+            <a:gs pos="50000">
+              <a:schemeClr val="phClr">
+                <a:satMod val="110000"/>
+                <a:lumMod val="100000"/>
+                <a:shade val="100000"/>
+              </a:schemeClr>
+            </a:gs>
+            <a:gs pos="100000">
+              <a:schemeClr val="phClr">
+                <a:lumMod val="99000"/>
+                <a:satMod val="120000"/>
+                <a:shade val="78000"/>
+              </a:schemeClr>
+            </a:gs>
+          </a:gsLst>
+          <a:lin ang="5400000" scaled="0"/>
+        </a:gradFill>
+      </a:fillStyleLst>
+      <a:lnStyleLst>
+        <a:ln w="6350" cap="flat" cmpd="sng" algn="ctr">
+          <a:solidFill>
+            <a:schemeClr val="phClr"/>
+          </a:solidFill>
+          <a:prstDash val="solid"/>
+          <a:miter lim="800000"/>
+        </a:ln>
+        <a:ln w="12700" cap="flat" cmpd="sng" algn="ctr">
+          <a:solidFill>
+            <a:schemeClr val="phClr"/>
+          </a:solidFill>
+          <a:prstDash val="solid"/>
+          <a:miter lim="800000"/>
+        </a:ln>
+        <a:ln w="19050" cap="flat" cmpd="sng" algn="ctr">
+          <a:solidFill>
+            <a:schemeClr val="phClr"/>
+          </a:solidFill>
+          <a:prstDash val="solid"/>
+          <a:miter lim="800000"/>
+        </a:ln>
+      </a:lnStyleLst>
+      <a:effectStyleLst>
+        <a:effectStyle>
+          <a:effectLst/>
+        </a:effectStyle>
+        <a:effectStyle>
+          <a:effectLst/>
+        </a:effectStyle>
+        <a:effectStyle>
+          <a:effectLst>
+            <a:outerShdw blurRad="57150" dist="19050" dir="5400000" algn="ctr" rotWithShape="0">
+              <a:srgbClr val="000000">
+                <a:alpha val="63000"/>
+              </a:srgbClr>
+            </a:outerShdw>
+          </a:effectLst>
+        </a:effectStyle>
+      </a:effectStyleLst>
+      <a:bgFillStyleLst>
+        <a:solidFill>
+          <a:schemeClr val="phClr"/>
+        </a:solidFill>
+        <a:solidFill>
+          <a:schemeClr val="phClr">
+            <a:tint val="95000"/>
+            <a:satMod val="170000"/>
+          </a:schemeClr>
+        </a:solidFill>
+        <a:gradFill rotWithShape="1">
+          <a:gsLst>
+            <a:gs pos="0">
+              <a:schemeClr val="phClr">
+                <a:tint val="93000"/>
+                <a:satMod val="150000"/>
+                <a:shade val="98000"/>
+                <a:lumMod val="102000"/>
+              </a:schemeClr>
+            </a:gs>
+            <a:gs pos="50000">
+              <a:schemeClr val="phClr">
+                <a:tint val="98000"/>
+                <a:satMod val="130000"/>
+                <a:shade val="90000"/>
+                <a:lumMod val="103000"/>
+              </a:schemeClr>
+            </a:gs>
+            <a:gs pos="100000">
+              <a:schemeClr val="phClr">
+                <a:shade val="63000"/>
+                <a:satMod val="120000"/>
+              </a:schemeClr>
+            </a:gs>
+          </a:gsLst>
+          <a:lin ang="5400000" scaled="0"/>
+        </a:gradFill>
+      </a:bgFillStyleLst>
+    </a:fmtScheme>
+  </a:themeElements>
+  <a:objectDefaults/>
+  <a:extraClrSchemeLst/>
+  <a:extLst>
+    <a:ext uri="{05A4C25C-085E-4340-85A3-A5531E510DB2}">
+      <thm15:themeFamily xmlns:thm15="http://schemas.microsoft.com/office/thememl/2012/main" name="Office Theme" id="{62F939B6-93AF-4DB8-9C6B-D6C7DFDC589F}" vid="{4A3C46E8-61CC-4603-A589-7422A47A8E4A}"/>
+    </a:ext>
+  </a:extLst>
+</a:theme>
 </file>
</xml_diff>

<commit_message>
ERD finished and added to presentation, some typos fixed
</commit_message>
<xml_diff>
--- a/Mid-year document & presentation/FCI-CU-GP-Midyear-Presentation.pptx
+++ b/Mid-year document & presentation/FCI-CU-GP-Midyear-Presentation.pptx
@@ -5,7 +5,7 @@
     <p:sldMasterId id="2147483648" r:id="rId1"/>
   </p:sldMasterIdLst>
   <p:notesMasterIdLst>
-    <p:notesMasterId r:id="rId24"/>
+    <p:notesMasterId r:id="rId26"/>
   </p:notesMasterIdLst>
   <p:sldIdLst>
     <p:sldId id="256" r:id="rId2"/>
@@ -24,12 +24,14 @@
     <p:sldId id="270" r:id="rId15"/>
     <p:sldId id="271" r:id="rId16"/>
     <p:sldId id="276" r:id="rId17"/>
-    <p:sldId id="277" r:id="rId18"/>
-    <p:sldId id="260" r:id="rId19"/>
-    <p:sldId id="278" r:id="rId20"/>
-    <p:sldId id="279" r:id="rId21"/>
-    <p:sldId id="261" r:id="rId22"/>
-    <p:sldId id="262" r:id="rId23"/>
+    <p:sldId id="280" r:id="rId18"/>
+    <p:sldId id="281" r:id="rId19"/>
+    <p:sldId id="277" r:id="rId20"/>
+    <p:sldId id="260" r:id="rId21"/>
+    <p:sldId id="278" r:id="rId22"/>
+    <p:sldId id="279" r:id="rId23"/>
+    <p:sldId id="261" r:id="rId24"/>
+    <p:sldId id="262" r:id="rId25"/>
   </p:sldIdLst>
   <p:sldSz cx="12192000" cy="6858000"/>
   <p:notesSz cx="6858000" cy="9144000"/>
@@ -218,7 +220,7 @@
           <a:p>
             <a:fld id="{8CDABC68-874F-49E3-B5D2-210DD8387BFF}" type="datetimeFigureOut">
               <a:rPr lang="en-US" smtClean="0"/>
-              <a:t>2018-02-15</a:t>
+              <a:t>2018-02-16</a:t>
             </a:fld>
             <a:endParaRPr lang="en-US"/>
           </a:p>
@@ -920,7 +922,7 @@
           <a:p>
             <a:fld id="{F03E57DB-E231-45C1-80AB-E8EAD4D6FBB2}" type="datetimeFigureOut">
               <a:rPr lang="en-US" smtClean="0"/>
-              <a:t>2018-02-15</a:t>
+              <a:t>2018-02-16</a:t>
             </a:fld>
             <a:endParaRPr lang="en-US"/>
           </a:p>
@@ -1118,7 +1120,7 @@
           <a:p>
             <a:fld id="{F03E57DB-E231-45C1-80AB-E8EAD4D6FBB2}" type="datetimeFigureOut">
               <a:rPr lang="en-US" smtClean="0"/>
-              <a:t>2018-02-15</a:t>
+              <a:t>2018-02-16</a:t>
             </a:fld>
             <a:endParaRPr lang="en-US"/>
           </a:p>
@@ -1326,7 +1328,7 @@
           <a:p>
             <a:fld id="{F03E57DB-E231-45C1-80AB-E8EAD4D6FBB2}" type="datetimeFigureOut">
               <a:rPr lang="en-US" smtClean="0"/>
-              <a:t>2018-02-15</a:t>
+              <a:t>2018-02-16</a:t>
             </a:fld>
             <a:endParaRPr lang="en-US"/>
           </a:p>
@@ -1524,7 +1526,7 @@
           <a:p>
             <a:fld id="{F03E57DB-E231-45C1-80AB-E8EAD4D6FBB2}" type="datetimeFigureOut">
               <a:rPr lang="en-US" smtClean="0"/>
-              <a:t>2018-02-15</a:t>
+              <a:t>2018-02-16</a:t>
             </a:fld>
             <a:endParaRPr lang="en-US"/>
           </a:p>
@@ -1799,7 +1801,7 @@
           <a:p>
             <a:fld id="{F03E57DB-E231-45C1-80AB-E8EAD4D6FBB2}" type="datetimeFigureOut">
               <a:rPr lang="en-US" smtClean="0"/>
-              <a:t>2018-02-15</a:t>
+              <a:t>2018-02-16</a:t>
             </a:fld>
             <a:endParaRPr lang="en-US"/>
           </a:p>
@@ -2064,7 +2066,7 @@
           <a:p>
             <a:fld id="{F03E57DB-E231-45C1-80AB-E8EAD4D6FBB2}" type="datetimeFigureOut">
               <a:rPr lang="en-US" smtClean="0"/>
-              <a:t>2018-02-15</a:t>
+              <a:t>2018-02-16</a:t>
             </a:fld>
             <a:endParaRPr lang="en-US"/>
           </a:p>
@@ -2476,7 +2478,7 @@
           <a:p>
             <a:fld id="{F03E57DB-E231-45C1-80AB-E8EAD4D6FBB2}" type="datetimeFigureOut">
               <a:rPr lang="en-US" smtClean="0"/>
-              <a:t>2018-02-15</a:t>
+              <a:t>2018-02-16</a:t>
             </a:fld>
             <a:endParaRPr lang="en-US"/>
           </a:p>
@@ -2617,7 +2619,7 @@
           <a:p>
             <a:fld id="{F03E57DB-E231-45C1-80AB-E8EAD4D6FBB2}" type="datetimeFigureOut">
               <a:rPr lang="en-US" smtClean="0"/>
-              <a:t>2018-02-15</a:t>
+              <a:t>2018-02-16</a:t>
             </a:fld>
             <a:endParaRPr lang="en-US"/>
           </a:p>
@@ -2730,7 +2732,7 @@
           <a:p>
             <a:fld id="{F03E57DB-E231-45C1-80AB-E8EAD4D6FBB2}" type="datetimeFigureOut">
               <a:rPr lang="en-US" smtClean="0"/>
-              <a:t>2018-02-15</a:t>
+              <a:t>2018-02-16</a:t>
             </a:fld>
             <a:endParaRPr lang="en-US"/>
           </a:p>
@@ -3041,7 +3043,7 @@
           <a:p>
             <a:fld id="{F03E57DB-E231-45C1-80AB-E8EAD4D6FBB2}" type="datetimeFigureOut">
               <a:rPr lang="en-US" smtClean="0"/>
-              <a:t>2018-02-15</a:t>
+              <a:t>2018-02-16</a:t>
             </a:fld>
             <a:endParaRPr lang="en-US"/>
           </a:p>
@@ -3329,7 +3331,7 @@
           <a:p>
             <a:fld id="{F03E57DB-E231-45C1-80AB-E8EAD4D6FBB2}" type="datetimeFigureOut">
               <a:rPr lang="en-US" smtClean="0"/>
-              <a:t>2018-02-15</a:t>
+              <a:t>2018-02-16</a:t>
             </a:fld>
             <a:endParaRPr lang="en-US"/>
           </a:p>
@@ -3570,7 +3572,7 @@
           <a:p>
             <a:fld id="{F03E57DB-E231-45C1-80AB-E8EAD4D6FBB2}" type="datetimeFigureOut">
               <a:rPr lang="en-US" smtClean="0"/>
-              <a:t>2018-02-15</a:t>
+              <a:t>2018-02-16</a:t>
             </a:fld>
             <a:endParaRPr lang="en-US"/>
           </a:p>
@@ -5357,6 +5359,264 @@
           <p:cNvPr id="2" name="Title 1">
             <a:extLst>
               <a:ext uri="{FF2B5EF4-FFF2-40B4-BE49-F238E27FC236}">
+                <a16:creationId xmlns:a16="http://schemas.microsoft.com/office/drawing/2014/main" id="{9FD3C50A-757A-441E-8F6E-3C092FD8C310}"/>
+              </a:ext>
+            </a:extLst>
+          </p:cNvPr>
+          <p:cNvSpPr>
+            <a:spLocks noGrp="1"/>
+          </p:cNvSpPr>
+          <p:nvPr>
+            <p:ph type="title"/>
+          </p:nvPr>
+        </p:nvSpPr>
+        <p:spPr/>
+        <p:txBody>
+          <a:bodyPr/>
+          <a:lstStyle/>
+          <a:p>
+            <a:endParaRPr lang="en-US"/>
+          </a:p>
+        </p:txBody>
+      </p:sp>
+      <p:pic>
+        <p:nvPicPr>
+          <p:cNvPr id="9" name="Content Placeholder 8">
+            <a:extLst>
+              <a:ext uri="{FF2B5EF4-FFF2-40B4-BE49-F238E27FC236}">
+                <a16:creationId xmlns:a16="http://schemas.microsoft.com/office/drawing/2014/main" id="{A73215AE-3878-40FA-81BF-C53308615572}"/>
+              </a:ext>
+            </a:extLst>
+          </p:cNvPr>
+          <p:cNvPicPr>
+            <a:picLocks noGrp="1" noChangeAspect="1"/>
+          </p:cNvPicPr>
+          <p:nvPr>
+            <p:ph idx="1"/>
+          </p:nvPr>
+        </p:nvPicPr>
+        <p:blipFill>
+          <a:blip r:embed="rId2">
+            <a:extLst>
+              <a:ext uri="{28A0092B-C50C-407E-A947-70E740481C1C}">
+                <a14:useLocalDpi xmlns:a14="http://schemas.microsoft.com/office/drawing/2010/main" val="0"/>
+              </a:ext>
+            </a:extLst>
+          </a:blip>
+          <a:stretch>
+            <a:fillRect/>
+          </a:stretch>
+        </p:blipFill>
+        <p:spPr>
+          <a:xfrm>
+            <a:off x="3739" y="97970"/>
+            <a:ext cx="12188261" cy="6492875"/>
+          </a:xfrm>
+        </p:spPr>
+      </p:pic>
+      <p:sp>
+        <p:nvSpPr>
+          <p:cNvPr id="10" name="TextBox 9">
+            <a:extLst>
+              <a:ext uri="{FF2B5EF4-FFF2-40B4-BE49-F238E27FC236}">
+                <a16:creationId xmlns:a16="http://schemas.microsoft.com/office/drawing/2014/main" id="{D20D43E8-7E5C-408E-A07D-BB4E23822114}"/>
+              </a:ext>
+            </a:extLst>
+          </p:cNvPr>
+          <p:cNvSpPr txBox="1"/>
+          <p:nvPr/>
+        </p:nvSpPr>
+        <p:spPr>
+          <a:xfrm>
+            <a:off x="838200" y="267155"/>
+            <a:ext cx="5201552" cy="707886"/>
+          </a:xfrm>
+          <a:prstGeom prst="rect">
+            <a:avLst/>
+          </a:prstGeom>
+          <a:noFill/>
+        </p:spPr>
+        <p:txBody>
+          <a:bodyPr wrap="none" rtlCol="0">
+            <a:spAutoFit/>
+          </a:bodyPr>
+          <a:lstStyle/>
+          <a:p>
+            <a:r>
+              <a:rPr lang="en-US" sz="4000" b="1" dirty="0">
+                <a:solidFill>
+                  <a:srgbClr val="FF0000"/>
+                </a:solidFill>
+              </a:rPr>
+              <a:t>Conceptual Data Model</a:t>
+            </a:r>
+          </a:p>
+        </p:txBody>
+      </p:sp>
+    </p:spTree>
+    <p:extLst>
+      <p:ext uri="{BB962C8B-B14F-4D97-AF65-F5344CB8AC3E}">
+        <p14:creationId xmlns:p14="http://schemas.microsoft.com/office/powerpoint/2010/main" val="1543093381"/>
+      </p:ext>
+    </p:extLst>
+  </p:cSld>
+  <p:clrMapOvr>
+    <a:masterClrMapping/>
+  </p:clrMapOvr>
+</p:sld>
+</file>
+
+<file path=ppt/slides/slide18.xml><?xml version="1.0" encoding="utf-8"?>
+<p:sld xmlns:a="http://schemas.openxmlformats.org/drawingml/2006/main" xmlns:r="http://schemas.openxmlformats.org/officeDocument/2006/relationships" xmlns:p="http://schemas.openxmlformats.org/presentationml/2006/main">
+  <p:cSld>
+    <p:spTree>
+      <p:nvGrpSpPr>
+        <p:cNvPr id="1" name=""/>
+        <p:cNvGrpSpPr/>
+        <p:nvPr/>
+      </p:nvGrpSpPr>
+      <p:grpSpPr>
+        <a:xfrm>
+          <a:off x="0" y="0"/>
+          <a:ext cx="0" cy="0"/>
+          <a:chOff x="0" y="0"/>
+          <a:chExt cx="0" cy="0"/>
+        </a:xfrm>
+      </p:grpSpPr>
+      <p:sp>
+        <p:nvSpPr>
+          <p:cNvPr id="2" name="Title 1">
+            <a:extLst>
+              <a:ext uri="{FF2B5EF4-FFF2-40B4-BE49-F238E27FC236}">
+                <a16:creationId xmlns:a16="http://schemas.microsoft.com/office/drawing/2014/main" id="{F6AF702E-6D14-4D71-8FA4-64F36224AAE2}"/>
+              </a:ext>
+            </a:extLst>
+          </p:cNvPr>
+          <p:cNvSpPr>
+            <a:spLocks noGrp="1"/>
+          </p:cNvSpPr>
+          <p:nvPr>
+            <p:ph type="title"/>
+          </p:nvPr>
+        </p:nvSpPr>
+        <p:spPr/>
+        <p:txBody>
+          <a:bodyPr/>
+          <a:lstStyle/>
+          <a:p>
+            <a:endParaRPr lang="en-US"/>
+          </a:p>
+        </p:txBody>
+      </p:sp>
+      <p:pic>
+        <p:nvPicPr>
+          <p:cNvPr id="5" name="Content Placeholder 4">
+            <a:extLst>
+              <a:ext uri="{FF2B5EF4-FFF2-40B4-BE49-F238E27FC236}">
+                <a16:creationId xmlns:a16="http://schemas.microsoft.com/office/drawing/2014/main" id="{4D02A020-6FEF-4DC7-9EB2-7D77238E2646}"/>
+              </a:ext>
+            </a:extLst>
+          </p:cNvPr>
+          <p:cNvPicPr>
+            <a:picLocks noGrp="1" noChangeAspect="1"/>
+          </p:cNvPicPr>
+          <p:nvPr>
+            <p:ph idx="1"/>
+          </p:nvPr>
+        </p:nvPicPr>
+        <p:blipFill>
+          <a:blip r:embed="rId2">
+            <a:extLst>
+              <a:ext uri="{28A0092B-C50C-407E-A947-70E740481C1C}">
+                <a14:useLocalDpi xmlns:a14="http://schemas.microsoft.com/office/drawing/2010/main" val="0"/>
+              </a:ext>
+            </a:extLst>
+          </a:blip>
+          <a:stretch>
+            <a:fillRect/>
+          </a:stretch>
+        </p:blipFill>
+        <p:spPr>
+          <a:xfrm>
+            <a:off x="419100" y="-8406"/>
+            <a:ext cx="11353800" cy="6874811"/>
+          </a:xfrm>
+        </p:spPr>
+      </p:pic>
+      <p:sp>
+        <p:nvSpPr>
+          <p:cNvPr id="6" name="TextBox 5">
+            <a:extLst>
+              <a:ext uri="{FF2B5EF4-FFF2-40B4-BE49-F238E27FC236}">
+                <a16:creationId xmlns:a16="http://schemas.microsoft.com/office/drawing/2014/main" id="{8ACF7767-B7A4-42EA-80F4-CE9D0B5354A7}"/>
+              </a:ext>
+            </a:extLst>
+          </p:cNvPr>
+          <p:cNvSpPr txBox="1"/>
+          <p:nvPr/>
+        </p:nvSpPr>
+        <p:spPr>
+          <a:xfrm>
+            <a:off x="838200" y="365125"/>
+            <a:ext cx="4501873" cy="707886"/>
+          </a:xfrm>
+          <a:prstGeom prst="rect">
+            <a:avLst/>
+          </a:prstGeom>
+          <a:noFill/>
+        </p:spPr>
+        <p:txBody>
+          <a:bodyPr wrap="none" rtlCol="0">
+            <a:spAutoFit/>
+          </a:bodyPr>
+          <a:lstStyle/>
+          <a:p>
+            <a:r>
+              <a:rPr lang="en-US" sz="4000" b="1" dirty="0">
+                <a:solidFill>
+                  <a:srgbClr val="FF0000"/>
+                </a:solidFill>
+              </a:rPr>
+              <a:t>Physical Data Model</a:t>
+            </a:r>
+          </a:p>
+        </p:txBody>
+      </p:sp>
+    </p:spTree>
+    <p:extLst>
+      <p:ext uri="{BB962C8B-B14F-4D97-AF65-F5344CB8AC3E}">
+        <p14:creationId xmlns:p14="http://schemas.microsoft.com/office/powerpoint/2010/main" val="2722686233"/>
+      </p:ext>
+    </p:extLst>
+  </p:cSld>
+  <p:clrMapOvr>
+    <a:masterClrMapping/>
+  </p:clrMapOvr>
+</p:sld>
+</file>
+
+<file path=ppt/slides/slide19.xml><?xml version="1.0" encoding="utf-8"?>
+<p:sld xmlns:a="http://schemas.openxmlformats.org/drawingml/2006/main" xmlns:r="http://schemas.openxmlformats.org/officeDocument/2006/relationships" xmlns:p="http://schemas.openxmlformats.org/presentationml/2006/main">
+  <p:cSld>
+    <p:spTree>
+      <p:nvGrpSpPr>
+        <p:cNvPr id="1" name=""/>
+        <p:cNvGrpSpPr/>
+        <p:nvPr/>
+      </p:nvGrpSpPr>
+      <p:grpSpPr>
+        <a:xfrm>
+          <a:off x="0" y="0"/>
+          <a:ext cx="0" cy="0"/>
+          <a:chOff x="0" y="0"/>
+          <a:chExt cx="0" cy="0"/>
+        </a:xfrm>
+      </p:grpSpPr>
+      <p:sp>
+        <p:nvSpPr>
+          <p:cNvPr id="2" name="Title 1">
+            <a:extLst>
+              <a:ext uri="{FF2B5EF4-FFF2-40B4-BE49-F238E27FC236}">
                 <a16:creationId xmlns:a16="http://schemas.microsoft.com/office/drawing/2014/main" id="{14F160BE-6003-4C2E-93A6-29B45F93CD7A}"/>
               </a:ext>
             </a:extLst>
@@ -5419,7 +5679,137 @@
 </p:sld>
 </file>
 
-<file path=ppt/slides/slide18.xml><?xml version="1.0" encoding="utf-8"?>
+<file path=ppt/slides/slide2.xml><?xml version="1.0" encoding="utf-8"?>
+<p:sld xmlns:a="http://schemas.openxmlformats.org/drawingml/2006/main" xmlns:r="http://schemas.openxmlformats.org/officeDocument/2006/relationships" xmlns:p="http://schemas.openxmlformats.org/presentationml/2006/main">
+  <p:cSld>
+    <p:spTree>
+      <p:nvGrpSpPr>
+        <p:cNvPr id="1" name=""/>
+        <p:cNvGrpSpPr/>
+        <p:nvPr/>
+      </p:nvGrpSpPr>
+      <p:grpSpPr>
+        <a:xfrm>
+          <a:off x="0" y="0"/>
+          <a:ext cx="0" cy="0"/>
+          <a:chOff x="0" y="0"/>
+          <a:chExt cx="0" cy="0"/>
+        </a:xfrm>
+      </p:grpSpPr>
+      <p:sp>
+        <p:nvSpPr>
+          <p:cNvPr id="2" name="Title 1">
+            <a:extLst>
+              <a:ext uri="{FF2B5EF4-FFF2-40B4-BE49-F238E27FC236}">
+                <a16:creationId xmlns:a16="http://schemas.microsoft.com/office/drawing/2014/main" id="{E437CDA6-4947-4F76-866C-C8FE24335A8D}"/>
+              </a:ext>
+            </a:extLst>
+          </p:cNvPr>
+          <p:cNvSpPr>
+            <a:spLocks noGrp="1"/>
+          </p:cNvSpPr>
+          <p:nvPr>
+            <p:ph type="title"/>
+          </p:nvPr>
+        </p:nvSpPr>
+        <p:spPr/>
+        <p:txBody>
+          <a:bodyPr/>
+          <a:lstStyle/>
+          <a:p>
+            <a:r>
+              <a:rPr lang="en-US" dirty="0"/>
+              <a:t>Project idea</a:t>
+            </a:r>
+          </a:p>
+        </p:txBody>
+      </p:sp>
+      <p:sp>
+        <p:nvSpPr>
+          <p:cNvPr id="3" name="Content Placeholder 2">
+            <a:extLst>
+              <a:ext uri="{FF2B5EF4-FFF2-40B4-BE49-F238E27FC236}">
+                <a16:creationId xmlns:a16="http://schemas.microsoft.com/office/drawing/2014/main" id="{6C142166-465D-4D9F-9DB3-6CDF9E15D97E}"/>
+              </a:ext>
+            </a:extLst>
+          </p:cNvPr>
+          <p:cNvSpPr>
+            <a:spLocks noGrp="1"/>
+          </p:cNvSpPr>
+          <p:nvPr>
+            <p:ph idx="1"/>
+          </p:nvPr>
+        </p:nvSpPr>
+        <p:spPr/>
+        <p:txBody>
+          <a:bodyPr/>
+          <a:lstStyle/>
+          <a:p>
+            <a:pPr marL="0" indent="0">
+              <a:buNone/>
+            </a:pPr>
+            <a:r>
+              <a:rPr lang="en-US" sz="3600" b="1" dirty="0">
+                <a:solidFill>
+                  <a:srgbClr val="FF0000"/>
+                </a:solidFill>
+              </a:rPr>
+              <a:t>FCI E-campus: </a:t>
+            </a:r>
+            <a:r>
+              <a:rPr lang="en-US" sz="3600" b="1" dirty="0"/>
+              <a:t>Timetable &amp; Materials Organizer.</a:t>
+            </a:r>
+          </a:p>
+          <a:p>
+            <a:r>
+              <a:rPr lang="en-US" dirty="0"/>
+              <a:t>Our app helps students stay organized by providing them with their schedule, depending on what courses they have registered.</a:t>
+            </a:r>
+          </a:p>
+          <a:p>
+            <a:r>
+              <a:rPr lang="en-US" dirty="0"/>
+              <a:t>It also notifies them for new announcements, upcoming quizzes and assignments deliveries to help them keep track with their courses.</a:t>
+            </a:r>
+          </a:p>
+          <a:p>
+            <a:r>
+              <a:rPr lang="en-US" dirty="0"/>
+              <a:t>The app will organize downloading and uploading materials.</a:t>
+            </a:r>
+          </a:p>
+          <a:p>
+            <a:r>
+              <a:rPr lang="en-US" dirty="0"/>
+              <a:t>That’s not it, the app will provide a forum for the students to communicate with each other.</a:t>
+            </a:r>
+          </a:p>
+          <a:p>
+            <a:r>
+              <a:rPr lang="en-US" dirty="0"/>
+              <a:t>And many, many more.</a:t>
+            </a:r>
+          </a:p>
+          <a:p>
+            <a:endParaRPr lang="en-US" dirty="0"/>
+          </a:p>
+        </p:txBody>
+      </p:sp>
+    </p:spTree>
+    <p:extLst>
+      <p:ext uri="{BB962C8B-B14F-4D97-AF65-F5344CB8AC3E}">
+        <p14:creationId xmlns:p14="http://schemas.microsoft.com/office/powerpoint/2010/main" val="1069236184"/>
+      </p:ext>
+    </p:extLst>
+  </p:cSld>
+  <p:clrMapOvr>
+    <a:masterClrMapping/>
+  </p:clrMapOvr>
+</p:sld>
+</file>
+
+<file path=ppt/slides/slide20.xml><?xml version="1.0" encoding="utf-8"?>
 <p:sld xmlns:a="http://schemas.openxmlformats.org/drawingml/2006/main" xmlns:r="http://schemas.openxmlformats.org/officeDocument/2006/relationships" xmlns:p="http://schemas.openxmlformats.org/presentationml/2006/main">
   <p:cSld>
     <p:spTree>
@@ -5697,13 +6087,13 @@
   <p:clrMapOvr>
     <a:masterClrMapping/>
   </p:clrMapOvr>
-  <mc:AlternateContent xmlns:mc="http://schemas.openxmlformats.org/markup-compatibility/2006">
-    <mc:Choice xmlns:p14="http://schemas.microsoft.com/office/powerpoint/2010/main" Requires="p14">
+  <mc:AlternateContent xmlns:mc="http://schemas.openxmlformats.org/markup-compatibility/2006" xmlns:p14="http://schemas.microsoft.com/office/powerpoint/2010/main">
+    <mc:Choice Requires="p14">
       <p:transition spd="med" p14:dur="700">
         <p:fade/>
       </p:transition>
     </mc:Choice>
-    <mc:Fallback>
+    <mc:Fallback xmlns="">
       <p:transition spd="med">
         <p:fade/>
       </p:transition>
@@ -5712,7 +6102,7 @@
 </p:sld>
 </file>
 
-<file path=ppt/slides/slide19.xml><?xml version="1.0" encoding="utf-8"?>
+<file path=ppt/slides/slide21.xml><?xml version="1.0" encoding="utf-8"?>
 <p:sld xmlns:a="http://schemas.openxmlformats.org/drawingml/2006/main" xmlns:r="http://schemas.openxmlformats.org/officeDocument/2006/relationships" xmlns:p="http://schemas.openxmlformats.org/presentationml/2006/main">
   <p:cSld>
     <p:spTree>
@@ -5993,137 +6383,7 @@
 </p:sld>
 </file>
 
-<file path=ppt/slides/slide2.xml><?xml version="1.0" encoding="utf-8"?>
-<p:sld xmlns:a="http://schemas.openxmlformats.org/drawingml/2006/main" xmlns:r="http://schemas.openxmlformats.org/officeDocument/2006/relationships" xmlns:p="http://schemas.openxmlformats.org/presentationml/2006/main">
-  <p:cSld>
-    <p:spTree>
-      <p:nvGrpSpPr>
-        <p:cNvPr id="1" name=""/>
-        <p:cNvGrpSpPr/>
-        <p:nvPr/>
-      </p:nvGrpSpPr>
-      <p:grpSpPr>
-        <a:xfrm>
-          <a:off x="0" y="0"/>
-          <a:ext cx="0" cy="0"/>
-          <a:chOff x="0" y="0"/>
-          <a:chExt cx="0" cy="0"/>
-        </a:xfrm>
-      </p:grpSpPr>
-      <p:sp>
-        <p:nvSpPr>
-          <p:cNvPr id="2" name="Title 1">
-            <a:extLst>
-              <a:ext uri="{FF2B5EF4-FFF2-40B4-BE49-F238E27FC236}">
-                <a16:creationId xmlns:a16="http://schemas.microsoft.com/office/drawing/2014/main" id="{E437CDA6-4947-4F76-866C-C8FE24335A8D}"/>
-              </a:ext>
-            </a:extLst>
-          </p:cNvPr>
-          <p:cNvSpPr>
-            <a:spLocks noGrp="1"/>
-          </p:cNvSpPr>
-          <p:nvPr>
-            <p:ph type="title"/>
-          </p:nvPr>
-        </p:nvSpPr>
-        <p:spPr/>
-        <p:txBody>
-          <a:bodyPr/>
-          <a:lstStyle/>
-          <a:p>
-            <a:r>
-              <a:rPr lang="en-US" dirty="0"/>
-              <a:t>Project idea</a:t>
-            </a:r>
-          </a:p>
-        </p:txBody>
-      </p:sp>
-      <p:sp>
-        <p:nvSpPr>
-          <p:cNvPr id="3" name="Content Placeholder 2">
-            <a:extLst>
-              <a:ext uri="{FF2B5EF4-FFF2-40B4-BE49-F238E27FC236}">
-                <a16:creationId xmlns:a16="http://schemas.microsoft.com/office/drawing/2014/main" id="{6C142166-465D-4D9F-9DB3-6CDF9E15D97E}"/>
-              </a:ext>
-            </a:extLst>
-          </p:cNvPr>
-          <p:cNvSpPr>
-            <a:spLocks noGrp="1"/>
-          </p:cNvSpPr>
-          <p:nvPr>
-            <p:ph idx="1"/>
-          </p:nvPr>
-        </p:nvSpPr>
-        <p:spPr/>
-        <p:txBody>
-          <a:bodyPr/>
-          <a:lstStyle/>
-          <a:p>
-            <a:pPr marL="0" indent="0">
-              <a:buNone/>
-            </a:pPr>
-            <a:r>
-              <a:rPr lang="en-US" sz="3600" b="1" dirty="0">
-                <a:solidFill>
-                  <a:srgbClr val="FF0000"/>
-                </a:solidFill>
-              </a:rPr>
-              <a:t>FCI E-campus: </a:t>
-            </a:r>
-            <a:r>
-              <a:rPr lang="en-US" sz="3600" b="1" dirty="0"/>
-              <a:t>Timetable &amp; Materials Organizer.</a:t>
-            </a:r>
-          </a:p>
-          <a:p>
-            <a:r>
-              <a:rPr lang="en-US" dirty="0"/>
-              <a:t>Our app helps students stay organized by providing them with their schedule, depending on what courses they have registered.</a:t>
-            </a:r>
-          </a:p>
-          <a:p>
-            <a:r>
-              <a:rPr lang="en-US" dirty="0"/>
-              <a:t>It also notify them for new announcements, upcoming quizzes and assignments deliveries to help them keep track with their courses.</a:t>
-            </a:r>
-          </a:p>
-          <a:p>
-            <a:r>
-              <a:rPr lang="en-US" dirty="0"/>
-              <a:t>The app will organize downloading and uploading materials.</a:t>
-            </a:r>
-          </a:p>
-          <a:p>
-            <a:r>
-              <a:rPr lang="en-US" dirty="0"/>
-              <a:t>That’s not it, the app will provide a forum for the students to communicate with each other.</a:t>
-            </a:r>
-          </a:p>
-          <a:p>
-            <a:r>
-              <a:rPr lang="en-US" dirty="0"/>
-              <a:t>And many, many more.</a:t>
-            </a:r>
-          </a:p>
-          <a:p>
-            <a:endParaRPr lang="en-US" dirty="0"/>
-          </a:p>
-        </p:txBody>
-      </p:sp>
-    </p:spTree>
-    <p:extLst>
-      <p:ext uri="{BB962C8B-B14F-4D97-AF65-F5344CB8AC3E}">
-        <p14:creationId xmlns:p14="http://schemas.microsoft.com/office/powerpoint/2010/main" val="1069236184"/>
-      </p:ext>
-    </p:extLst>
-  </p:cSld>
-  <p:clrMapOvr>
-    <a:masterClrMapping/>
-  </p:clrMapOvr>
-</p:sld>
-</file>
-
-<file path=ppt/slides/slide20.xml><?xml version="1.0" encoding="utf-8"?>
+<file path=ppt/slides/slide22.xml><?xml version="1.0" encoding="utf-8"?>
 <p:sld xmlns:a="http://schemas.openxmlformats.org/drawingml/2006/main" xmlns:r="http://schemas.openxmlformats.org/officeDocument/2006/relationships" xmlns:p="http://schemas.openxmlformats.org/presentationml/2006/main">
   <p:cSld>
     <p:spTree>
@@ -6404,7 +6664,7 @@
 </p:sld>
 </file>
 
-<file path=ppt/slides/slide21.xml><?xml version="1.0" encoding="utf-8"?>
+<file path=ppt/slides/slide23.xml><?xml version="1.0" encoding="utf-8"?>
 <p:sld xmlns:a="http://schemas.openxmlformats.org/drawingml/2006/main" xmlns:r="http://schemas.openxmlformats.org/officeDocument/2006/relationships" xmlns:p="http://schemas.openxmlformats.org/presentationml/2006/main">
   <p:cSld>
     <p:spTree>
@@ -6496,7 +6756,7 @@
 </p:sld>
 </file>
 
-<file path=ppt/slides/slide22.xml><?xml version="1.0" encoding="utf-8"?>
+<file path=ppt/slides/slide24.xml><?xml version="1.0" encoding="utf-8"?>
 <p:sld xmlns:a="http://schemas.openxmlformats.org/drawingml/2006/main" xmlns:r="http://schemas.openxmlformats.org/officeDocument/2006/relationships" xmlns:p="http://schemas.openxmlformats.org/presentationml/2006/main">
   <p:cSld>
     <p:spTree>

</xml_diff>